<commit_message>
First notebook completed, progressing on presentations for Day 1
</commit_message>
<xml_diff>
--- a/deep-learning-in-practice-with-pytorch/0-introduction.pptx
+++ b/deep-learning-in-practice-with-pytorch/0-introduction.pptx
@@ -213,7 +213,7 @@
           <a:p>
             <a:fld id="{C8652949-E600-4D43-A26B-20271E89D95E}" type="datetimeFigureOut">
               <a:rPr lang="en-US" smtClean="0"/>
-              <a:t>3/27/2024</a:t>
+              <a:t>3/30/2024</a:t>
             </a:fld>
             <a:endParaRPr lang="en-US"/>
           </a:p>
@@ -5402,6 +5402,13 @@
             <a:r>
               <a:rPr lang="it-IT" dirty="0"/>
               <a:t>Basic usage of pytorch and a few other DL libraries</a:t>
+            </a:r>
+          </a:p>
+          <a:p>
+            <a:pPr lvl="1"/>
+            <a:r>
+              <a:rPr lang="it-IT" dirty="0"/>
+              <a:t>Where to find and how to use large pre-trained models</a:t>
             </a:r>
             <a:endParaRPr lang="en-US" dirty="0"/>
           </a:p>

</xml_diff>

<commit_message>
More slides and a script.
</commit_message>
<xml_diff>
--- a/deep-learning-in-practice-with-pytorch/0-introduction.pptx
+++ b/deep-learning-in-practice-with-pytorch/0-introduction.pptx
@@ -5,7 +5,7 @@
     <p:sldMasterId id="2147483648" r:id="rId1"/>
   </p:sldMasterIdLst>
   <p:notesMasterIdLst>
-    <p:notesMasterId r:id="rId19"/>
+    <p:notesMasterId r:id="rId20"/>
   </p:notesMasterIdLst>
   <p:sldIdLst>
     <p:sldId id="257" r:id="rId2"/>
@@ -24,7 +24,8 @@
     <p:sldId id="300" r:id="rId15"/>
     <p:sldId id="266" r:id="rId16"/>
     <p:sldId id="302" r:id="rId17"/>
-    <p:sldId id="301" r:id="rId18"/>
+    <p:sldId id="304" r:id="rId18"/>
+    <p:sldId id="301" r:id="rId19"/>
   </p:sldIdLst>
   <p:sldSz cx="12192000" cy="6858000"/>
   <p:notesSz cx="6858000" cy="9144000"/>
@@ -213,7 +214,7 @@
           <a:p>
             <a:fld id="{C8652949-E600-4D43-A26B-20271E89D95E}" type="datetimeFigureOut">
               <a:rPr lang="en-US" smtClean="0"/>
-              <a:t>3/30/2024</a:t>
+              <a:t>4/1/2024</a:t>
             </a:fld>
             <a:endParaRPr lang="en-US"/>
           </a:p>
@@ -933,7 +934,7 @@
           <p:nvPr userDrawn="1"/>
         </p:nvPicPr>
         <p:blipFill rotWithShape="1">
-          <a:blip r:embed="rId6">
+          <a:blip r:embed="rId6" cstate="print">
             <a:extLst>
               <a:ext uri="{BEBA8EAE-BF5A-486C-A8C5-ECC9F3942E4B}">
                 <a14:imgProps xmlns:a14="http://schemas.microsoft.com/office/drawing/2010/main">
@@ -987,7 +988,13 @@
           <p:nvPr userDrawn="1"/>
         </p:nvPicPr>
         <p:blipFill>
-          <a:blip r:embed="rId8"/>
+          <a:blip r:embed="rId8">
+            <a:extLst>
+              <a:ext uri="{28A0092B-C50C-407E-A947-70E740481C1C}">
+                <a14:useLocalDpi xmlns:a14="http://schemas.microsoft.com/office/drawing/2010/main" val="0"/>
+              </a:ext>
+            </a:extLst>
+          </a:blip>
           <a:stretch>
             <a:fillRect/>
           </a:stretch>
@@ -1387,7 +1394,7 @@
           <p:nvPr userDrawn="1"/>
         </p:nvPicPr>
         <p:blipFill rotWithShape="1">
-          <a:blip r:embed="rId6">
+          <a:blip r:embed="rId6" cstate="print">
             <a:extLst>
               <a:ext uri="{BEBA8EAE-BF5A-486C-A8C5-ECC9F3942E4B}">
                 <a14:imgProps xmlns:a14="http://schemas.microsoft.com/office/drawing/2010/main">
@@ -1441,7 +1448,13 @@
           <p:nvPr userDrawn="1"/>
         </p:nvPicPr>
         <p:blipFill>
-          <a:blip r:embed="rId8"/>
+          <a:blip r:embed="rId8">
+            <a:extLst>
+              <a:ext uri="{28A0092B-C50C-407E-A947-70E740481C1C}">
+                <a14:useLocalDpi xmlns:a14="http://schemas.microsoft.com/office/drawing/2010/main" val="0"/>
+              </a:ext>
+            </a:extLst>
+          </a:blip>
           <a:stretch>
             <a:fillRect/>
           </a:stretch>
@@ -2677,7 +2690,13 @@
             <p:nvPr/>
           </p:nvPicPr>
           <p:blipFill>
-            <a:blip r:embed="rId2"/>
+            <a:blip r:embed="rId2">
+              <a:extLst>
+                <a:ext uri="{28A0092B-C50C-407E-A947-70E740481C1C}">
+                  <a14:useLocalDpi xmlns:a14="http://schemas.microsoft.com/office/drawing/2010/main" val="0"/>
+                </a:ext>
+              </a:extLst>
+            </a:blip>
             <a:stretch>
               <a:fillRect/>
             </a:stretch>
@@ -2917,7 +2936,13 @@
           <p:nvPr/>
         </p:nvPicPr>
         <p:blipFill>
-          <a:blip r:embed="rId7"/>
+          <a:blip r:embed="rId7">
+            <a:extLst>
+              <a:ext uri="{28A0092B-C50C-407E-A947-70E740481C1C}">
+                <a14:useLocalDpi xmlns:a14="http://schemas.microsoft.com/office/drawing/2010/main" val="0"/>
+              </a:ext>
+            </a:extLst>
+          </a:blip>
           <a:stretch>
             <a:fillRect/>
           </a:stretch>
@@ -3776,8 +3801,8 @@
           <a:p>
             <a:pPr algn="ctr"/>
             <a:r>
-              <a:rPr lang="en-US" dirty="0"/>
-              <a:t>Day 1:</a:t>
+              <a:rPr lang="en-US" b="1" dirty="0"/>
+              <a:t>April 02</a:t>
             </a:r>
             <a:br>
               <a:rPr lang="en-US" dirty="0"/>
@@ -3858,8 +3883,8 @@
           <a:p>
             <a:pPr algn="ctr"/>
             <a:r>
-              <a:rPr lang="en-US" dirty="0"/>
-              <a:t>Day 2:</a:t>
+              <a:rPr lang="en-US" b="1" dirty="0"/>
+              <a:t>April 04</a:t>
             </a:r>
             <a:br>
               <a:rPr lang="en-US" dirty="0"/>
@@ -3927,8 +3952,8 @@
           <a:p>
             <a:pPr algn="ctr"/>
             <a:r>
-              <a:rPr lang="en-US" dirty="0"/>
-              <a:t>Day 3:</a:t>
+              <a:rPr lang="en-US" b="1" dirty="0"/>
+              <a:t>April 08</a:t>
             </a:r>
             <a:br>
               <a:rPr lang="en-US" dirty="0"/>
@@ -4007,12 +4032,12 @@
           <a:p>
             <a:pPr algn="ctr"/>
             <a:r>
-              <a:rPr lang="en-US" dirty="0">
+              <a:rPr lang="en-US" b="1" dirty="0">
                 <a:solidFill>
                   <a:schemeClr val="tx1"/>
                 </a:solidFill>
               </a:rPr>
-              <a:t>Day 4:</a:t>
+              <a:t>April 10</a:t>
             </a:r>
           </a:p>
           <a:p>
@@ -4088,12 +4113,12 @@
           <a:p>
             <a:pPr algn="ctr"/>
             <a:r>
-              <a:rPr lang="en-US" dirty="0">
+              <a:rPr lang="en-US" b="1" dirty="0">
                 <a:solidFill>
                   <a:schemeClr val="tx1"/>
                 </a:solidFill>
               </a:rPr>
-              <a:t>Day 5:</a:t>
+              <a:t>April 12</a:t>
             </a:r>
           </a:p>
           <a:p>
@@ -4141,65 +4166,10 @@
       </p:grpSpPr>
       <p:sp>
         <p:nvSpPr>
-          <p:cNvPr id="2" name="Titre 1">
-            <a:extLst>
-              <a:ext uri="{FF2B5EF4-FFF2-40B4-BE49-F238E27FC236}">
-                <a16:creationId xmlns:a16="http://schemas.microsoft.com/office/drawing/2014/main" id="{563510CA-3994-440D-9624-DEF4A6B4D263}"/>
-              </a:ext>
-            </a:extLst>
-          </p:cNvPr>
-          <p:cNvSpPr>
-            <a:spLocks noGrp="1"/>
-          </p:cNvSpPr>
-          <p:nvPr>
-            <p:ph type="title"/>
-          </p:nvPr>
-        </p:nvSpPr>
-        <p:spPr/>
-        <p:txBody>
-          <a:bodyPr>
-            <a:normAutofit/>
-          </a:bodyPr>
-          <a:lstStyle/>
-          <a:p>
-            <a:r>
-              <a:rPr lang="en-US" dirty="0"/>
-              <a:t>(Tentative) Planning</a:t>
-            </a:r>
-          </a:p>
-        </p:txBody>
-      </p:sp>
-      <p:sp>
-        <p:nvSpPr>
-          <p:cNvPr id="3" name="Espace réservé du texte 2">
-            <a:extLst>
-              <a:ext uri="{FF2B5EF4-FFF2-40B4-BE49-F238E27FC236}">
-                <a16:creationId xmlns:a16="http://schemas.microsoft.com/office/drawing/2014/main" id="{CDF58B45-85FA-4108-AA84-5A31C0552D03}"/>
-              </a:ext>
-            </a:extLst>
-          </p:cNvPr>
-          <p:cNvSpPr>
-            <a:spLocks noGrp="1"/>
-          </p:cNvSpPr>
-          <p:nvPr>
-            <p:ph type="body" sz="quarter" idx="10"/>
-          </p:nvPr>
-        </p:nvSpPr>
-        <p:spPr/>
-        <p:txBody>
-          <a:bodyPr/>
-          <a:lstStyle/>
-          <a:p>
-            <a:endParaRPr lang="en-US" dirty="0"/>
-          </a:p>
-        </p:txBody>
-      </p:sp>
-      <p:sp>
-        <p:nvSpPr>
-          <p:cNvPr id="4" name="Rectangle : coins arrondis 3">
-            <a:extLst>
-              <a:ext uri="{FF2B5EF4-FFF2-40B4-BE49-F238E27FC236}">
-                <a16:creationId xmlns:a16="http://schemas.microsoft.com/office/drawing/2014/main" id="{B50E40AE-B061-4015-AD26-DD07FB8047D6}"/>
+          <p:cNvPr id="13" name="Rectangle : coins arrondis 12">
+            <a:extLst>
+              <a:ext uri="{FF2B5EF4-FFF2-40B4-BE49-F238E27FC236}">
+                <a16:creationId xmlns:a16="http://schemas.microsoft.com/office/drawing/2014/main" id="{8599907B-B1AF-490F-B54B-BC169006C180}"/>
               </a:ext>
             </a:extLst>
           </p:cNvPr>
@@ -4249,8 +4219,8 @@
           <a:p>
             <a:pPr algn="ctr"/>
             <a:r>
-              <a:rPr lang="en-US" dirty="0"/>
-              <a:t>Day 1:</a:t>
+              <a:rPr lang="en-US" b="1" dirty="0"/>
+              <a:t>April 02</a:t>
             </a:r>
             <a:br>
               <a:rPr lang="en-US" dirty="0"/>
@@ -4278,10 +4248,10 @@
       </p:sp>
       <p:sp>
         <p:nvSpPr>
-          <p:cNvPr id="5" name="Rectangle : coins arrondis 4">
-            <a:extLst>
-              <a:ext uri="{FF2B5EF4-FFF2-40B4-BE49-F238E27FC236}">
-                <a16:creationId xmlns:a16="http://schemas.microsoft.com/office/drawing/2014/main" id="{927828C2-D2D1-4745-A760-DE543579A63B}"/>
+          <p:cNvPr id="14" name="Rectangle : coins arrondis 13">
+            <a:extLst>
+              <a:ext uri="{FF2B5EF4-FFF2-40B4-BE49-F238E27FC236}">
+                <a16:creationId xmlns:a16="http://schemas.microsoft.com/office/drawing/2014/main" id="{C1B09DAC-BF03-4263-B0AA-EE9AA4363A9F}"/>
               </a:ext>
             </a:extLst>
           </p:cNvPr>
@@ -4331,8 +4301,8 @@
           <a:p>
             <a:pPr algn="ctr"/>
             <a:r>
-              <a:rPr lang="en-US" dirty="0"/>
-              <a:t>Day 2:</a:t>
+              <a:rPr lang="en-US" b="1" dirty="0"/>
+              <a:t>April 04</a:t>
             </a:r>
             <a:br>
               <a:rPr lang="en-US" dirty="0"/>
@@ -4346,10 +4316,10 @@
       </p:sp>
       <p:sp>
         <p:nvSpPr>
-          <p:cNvPr id="6" name="Rectangle : coins arrondis 5">
-            <a:extLst>
-              <a:ext uri="{FF2B5EF4-FFF2-40B4-BE49-F238E27FC236}">
-                <a16:creationId xmlns:a16="http://schemas.microsoft.com/office/drawing/2014/main" id="{0EFCF3FA-5F5F-4A88-A1BF-99B1CB79B13D}"/>
+          <p:cNvPr id="15" name="Rectangle : coins arrondis 14">
+            <a:extLst>
+              <a:ext uri="{FF2B5EF4-FFF2-40B4-BE49-F238E27FC236}">
+                <a16:creationId xmlns:a16="http://schemas.microsoft.com/office/drawing/2014/main" id="{E9AB8ACA-8B9D-4A69-B9C7-CB229148662A}"/>
               </a:ext>
             </a:extLst>
           </p:cNvPr>
@@ -4400,8 +4370,8 @@
           <a:p>
             <a:pPr algn="ctr"/>
             <a:r>
-              <a:rPr lang="en-US" dirty="0"/>
-              <a:t>Day 3:</a:t>
+              <a:rPr lang="en-US" b="1" dirty="0"/>
+              <a:t>April 08</a:t>
             </a:r>
             <a:br>
               <a:rPr lang="en-US" dirty="0"/>
@@ -4426,10 +4396,10 @@
       </p:sp>
       <p:sp>
         <p:nvSpPr>
-          <p:cNvPr id="7" name="Rectangle : coins arrondis 6">
-            <a:extLst>
-              <a:ext uri="{FF2B5EF4-FFF2-40B4-BE49-F238E27FC236}">
-                <a16:creationId xmlns:a16="http://schemas.microsoft.com/office/drawing/2014/main" id="{3AD48CF9-87DC-4C66-92EC-8A3B98F62C0B}"/>
+          <p:cNvPr id="16" name="Rectangle : coins arrondis 15">
+            <a:extLst>
+              <a:ext uri="{FF2B5EF4-FFF2-40B4-BE49-F238E27FC236}">
+                <a16:creationId xmlns:a16="http://schemas.microsoft.com/office/drawing/2014/main" id="{B02F0317-2B92-4D43-98BD-F74DB5151E08}"/>
               </a:ext>
             </a:extLst>
           </p:cNvPr>
@@ -4480,12 +4450,12 @@
           <a:p>
             <a:pPr algn="ctr"/>
             <a:r>
-              <a:rPr lang="en-US" dirty="0">
+              <a:rPr lang="en-US" b="1" dirty="0">
                 <a:solidFill>
                   <a:schemeClr val="tx1"/>
                 </a:solidFill>
               </a:rPr>
-              <a:t>Day 4:</a:t>
+              <a:t>April 10</a:t>
             </a:r>
           </a:p>
           <a:p>
@@ -4507,10 +4477,10 @@
       </p:sp>
       <p:sp>
         <p:nvSpPr>
-          <p:cNvPr id="8" name="Rectangle : coins arrondis 7">
-            <a:extLst>
-              <a:ext uri="{FF2B5EF4-FFF2-40B4-BE49-F238E27FC236}">
-                <a16:creationId xmlns:a16="http://schemas.microsoft.com/office/drawing/2014/main" id="{42DB3220-30E7-4BB7-9332-1FB053E084B2}"/>
+          <p:cNvPr id="17" name="Rectangle : coins arrondis 16">
+            <a:extLst>
+              <a:ext uri="{FF2B5EF4-FFF2-40B4-BE49-F238E27FC236}">
+                <a16:creationId xmlns:a16="http://schemas.microsoft.com/office/drawing/2014/main" id="{D6FF4C34-2A37-42DF-9F01-8D7F86FEE0D6}"/>
               </a:ext>
             </a:extLst>
           </p:cNvPr>
@@ -4561,12 +4531,12 @@
           <a:p>
             <a:pPr algn="ctr"/>
             <a:r>
-              <a:rPr lang="en-US" dirty="0">
+              <a:rPr lang="en-US" b="1" dirty="0">
                 <a:solidFill>
                   <a:schemeClr val="tx1"/>
                 </a:solidFill>
               </a:rPr>
-              <a:t>Day 5:</a:t>
+              <a:t>April 12</a:t>
             </a:r>
           </a:p>
           <a:p>
@@ -4578,6 +4548,36 @@
                 </a:solidFill>
               </a:rPr>
               <a:t>Project and/or advanced topics (Physics-informed Neural Networks, Hybrid models, Neural-symbolic AI, Causality)</a:t>
+            </a:r>
+          </a:p>
+        </p:txBody>
+      </p:sp>
+      <p:sp>
+        <p:nvSpPr>
+          <p:cNvPr id="2" name="Titre 1">
+            <a:extLst>
+              <a:ext uri="{FF2B5EF4-FFF2-40B4-BE49-F238E27FC236}">
+                <a16:creationId xmlns:a16="http://schemas.microsoft.com/office/drawing/2014/main" id="{563510CA-3994-440D-9624-DEF4A6B4D263}"/>
+              </a:ext>
+            </a:extLst>
+          </p:cNvPr>
+          <p:cNvSpPr>
+            <a:spLocks noGrp="1"/>
+          </p:cNvSpPr>
+          <p:nvPr>
+            <p:ph type="title"/>
+          </p:nvPr>
+        </p:nvSpPr>
+        <p:spPr/>
+        <p:txBody>
+          <a:bodyPr>
+            <a:normAutofit/>
+          </a:bodyPr>
+          <a:lstStyle/>
+          <a:p>
+            <a:r>
+              <a:rPr lang="en-US" dirty="0"/>
+              <a:t>(Tentative) Planning</a:t>
             </a:r>
           </a:p>
         </p:txBody>
@@ -4743,6 +4743,630 @@
 </file>
 
 <file path=ppt/slides/slide17.xml><?xml version="1.0" encoding="utf-8"?>
+<p:sld xmlns:a="http://schemas.openxmlformats.org/drawingml/2006/main" xmlns:r="http://schemas.openxmlformats.org/officeDocument/2006/relationships" xmlns:p="http://schemas.openxmlformats.org/presentationml/2006/main">
+  <p:cSld>
+    <p:spTree>
+      <p:nvGrpSpPr>
+        <p:cNvPr id="1" name=""/>
+        <p:cNvGrpSpPr/>
+        <p:nvPr/>
+      </p:nvGrpSpPr>
+      <p:grpSpPr>
+        <a:xfrm>
+          <a:off x="0" y="0"/>
+          <a:ext cx="0" cy="0"/>
+          <a:chOff x="0" y="0"/>
+          <a:chExt cx="0" cy="0"/>
+        </a:xfrm>
+      </p:grpSpPr>
+      <p:sp>
+        <p:nvSpPr>
+          <p:cNvPr id="2" name="Titre 1">
+            <a:extLst>
+              <a:ext uri="{FF2B5EF4-FFF2-40B4-BE49-F238E27FC236}">
+                <a16:creationId xmlns:a16="http://schemas.microsoft.com/office/drawing/2014/main" id="{563510CA-3994-440D-9624-DEF4A6B4D263}"/>
+              </a:ext>
+            </a:extLst>
+          </p:cNvPr>
+          <p:cNvSpPr>
+            <a:spLocks noGrp="1"/>
+          </p:cNvSpPr>
+          <p:nvPr>
+            <p:ph type="title"/>
+          </p:nvPr>
+        </p:nvSpPr>
+        <p:spPr/>
+        <p:txBody>
+          <a:bodyPr>
+            <a:normAutofit/>
+          </a:bodyPr>
+          <a:lstStyle/>
+          <a:p>
+            <a:r>
+              <a:rPr lang="en-US" dirty="0"/>
+              <a:t>(Tentative) Planning</a:t>
+            </a:r>
+          </a:p>
+        </p:txBody>
+      </p:sp>
+      <p:sp>
+        <p:nvSpPr>
+          <p:cNvPr id="13" name="Espace réservé du texte 2">
+            <a:extLst>
+              <a:ext uri="{FF2B5EF4-FFF2-40B4-BE49-F238E27FC236}">
+                <a16:creationId xmlns:a16="http://schemas.microsoft.com/office/drawing/2014/main" id="{718F99E1-3FE9-494B-86BA-5C44D04E17E0}"/>
+              </a:ext>
+            </a:extLst>
+          </p:cNvPr>
+          <p:cNvSpPr>
+            <a:spLocks noGrp="1"/>
+          </p:cNvSpPr>
+          <p:nvPr>
+            <p:ph type="body" sz="quarter" idx="10"/>
+          </p:nvPr>
+        </p:nvSpPr>
+        <p:spPr>
+          <a:xfrm>
+            <a:off x="838200" y="1423358"/>
+            <a:ext cx="10515600" cy="4675817"/>
+          </a:xfrm>
+        </p:spPr>
+        <p:txBody>
+          <a:bodyPr/>
+          <a:lstStyle/>
+          <a:p>
+            <a:endParaRPr lang="en-US" dirty="0"/>
+          </a:p>
+        </p:txBody>
+      </p:sp>
+      <p:sp>
+        <p:nvSpPr>
+          <p:cNvPr id="14" name="Rectangle : coins arrondis 13">
+            <a:extLst>
+              <a:ext uri="{FF2B5EF4-FFF2-40B4-BE49-F238E27FC236}">
+                <a16:creationId xmlns:a16="http://schemas.microsoft.com/office/drawing/2014/main" id="{8E9179F8-D187-4E98-9D28-733A80F97B89}"/>
+              </a:ext>
+            </a:extLst>
+          </p:cNvPr>
+          <p:cNvSpPr/>
+          <p:nvPr/>
+        </p:nvSpPr>
+        <p:spPr>
+          <a:xfrm>
+            <a:off x="630806" y="1423358"/>
+            <a:ext cx="1885360" cy="4458968"/>
+          </a:xfrm>
+          <a:prstGeom prst="roundRect">
+            <a:avLst/>
+          </a:prstGeom>
+          <a:solidFill>
+            <a:schemeClr val="accent6">
+              <a:lumMod val="50000"/>
+            </a:schemeClr>
+          </a:solidFill>
+          <a:ln>
+            <a:solidFill>
+              <a:schemeClr val="accent6">
+                <a:lumMod val="50000"/>
+              </a:schemeClr>
+            </a:solidFill>
+          </a:ln>
+        </p:spPr>
+        <p:style>
+          <a:lnRef idx="2">
+            <a:schemeClr val="accent1">
+              <a:shade val="50000"/>
+            </a:schemeClr>
+          </a:lnRef>
+          <a:fillRef idx="1">
+            <a:schemeClr val="accent1"/>
+          </a:fillRef>
+          <a:effectRef idx="0">
+            <a:schemeClr val="accent1"/>
+          </a:effectRef>
+          <a:fontRef idx="minor">
+            <a:schemeClr val="lt1"/>
+          </a:fontRef>
+        </p:style>
+        <p:txBody>
+          <a:bodyPr rtlCol="0" anchor="ctr"/>
+          <a:lstStyle/>
+          <a:p>
+            <a:pPr algn="ctr"/>
+            <a:r>
+              <a:rPr lang="en-US" b="1" dirty="0"/>
+              <a:t>April 02</a:t>
+            </a:r>
+            <a:br>
+              <a:rPr lang="en-US" dirty="0"/>
+            </a:br>
+            <a:r>
+              <a:rPr lang="en-US" dirty="0"/>
+              <a:t>Introduction,</a:t>
+            </a:r>
+            <a:br>
+              <a:rPr lang="en-US" dirty="0"/>
+            </a:br>
+            <a:r>
+              <a:rPr lang="en-US" dirty="0"/>
+              <a:t>ML summary,</a:t>
+            </a:r>
+            <a:br>
+              <a:rPr lang="en-US" dirty="0"/>
+            </a:br>
+            <a:r>
+              <a:rPr lang="en-US" dirty="0"/>
+              <a:t>Basics of deep neural networks</a:t>
+            </a:r>
+          </a:p>
+        </p:txBody>
+      </p:sp>
+      <p:sp>
+        <p:nvSpPr>
+          <p:cNvPr id="15" name="Rectangle : coins arrondis 14">
+            <a:extLst>
+              <a:ext uri="{FF2B5EF4-FFF2-40B4-BE49-F238E27FC236}">
+                <a16:creationId xmlns:a16="http://schemas.microsoft.com/office/drawing/2014/main" id="{D4FEBA0F-3EE8-4F0C-9A0F-2843F54D9EF7}"/>
+              </a:ext>
+            </a:extLst>
+          </p:cNvPr>
+          <p:cNvSpPr/>
+          <p:nvPr/>
+        </p:nvSpPr>
+        <p:spPr>
+          <a:xfrm>
+            <a:off x="2904238" y="1423358"/>
+            <a:ext cx="1885360" cy="4458968"/>
+          </a:xfrm>
+          <a:prstGeom prst="roundRect">
+            <a:avLst/>
+          </a:prstGeom>
+          <a:solidFill>
+            <a:schemeClr val="accent6">
+              <a:lumMod val="75000"/>
+            </a:schemeClr>
+          </a:solidFill>
+          <a:ln>
+            <a:solidFill>
+              <a:schemeClr val="accent6">
+                <a:lumMod val="50000"/>
+              </a:schemeClr>
+            </a:solidFill>
+          </a:ln>
+        </p:spPr>
+        <p:style>
+          <a:lnRef idx="2">
+            <a:schemeClr val="accent1">
+              <a:shade val="50000"/>
+            </a:schemeClr>
+          </a:lnRef>
+          <a:fillRef idx="1">
+            <a:schemeClr val="accent1"/>
+          </a:fillRef>
+          <a:effectRef idx="0">
+            <a:schemeClr val="accent1"/>
+          </a:effectRef>
+          <a:fontRef idx="minor">
+            <a:schemeClr val="lt1"/>
+          </a:fontRef>
+        </p:style>
+        <p:txBody>
+          <a:bodyPr rtlCol="0" anchor="ctr"/>
+          <a:lstStyle/>
+          <a:p>
+            <a:pPr algn="ctr"/>
+            <a:r>
+              <a:rPr lang="en-US" b="1" dirty="0"/>
+              <a:t>April 04</a:t>
+            </a:r>
+            <a:br>
+              <a:rPr lang="en-US" dirty="0"/>
+            </a:br>
+            <a:r>
+              <a:rPr lang="en-US" dirty="0"/>
+              <a:t>Convolutional Neural Networks</a:t>
+            </a:r>
+          </a:p>
+        </p:txBody>
+      </p:sp>
+      <p:sp>
+        <p:nvSpPr>
+          <p:cNvPr id="16" name="Rectangle : coins arrondis 15">
+            <a:extLst>
+              <a:ext uri="{FF2B5EF4-FFF2-40B4-BE49-F238E27FC236}">
+                <a16:creationId xmlns:a16="http://schemas.microsoft.com/office/drawing/2014/main" id="{3FEA87B9-F6E4-4891-AA8C-C48CDA53F3E9}"/>
+              </a:ext>
+            </a:extLst>
+          </p:cNvPr>
+          <p:cNvSpPr/>
+          <p:nvPr/>
+        </p:nvSpPr>
+        <p:spPr>
+          <a:xfrm>
+            <a:off x="5177670" y="1423358"/>
+            <a:ext cx="1885360" cy="4458968"/>
+          </a:xfrm>
+          <a:prstGeom prst="roundRect">
+            <a:avLst/>
+          </a:prstGeom>
+          <a:solidFill>
+            <a:schemeClr val="accent6">
+              <a:lumMod val="60000"/>
+              <a:lumOff val="40000"/>
+            </a:schemeClr>
+          </a:solidFill>
+          <a:ln>
+            <a:solidFill>
+              <a:schemeClr val="accent6">
+                <a:lumMod val="50000"/>
+              </a:schemeClr>
+            </a:solidFill>
+          </a:ln>
+        </p:spPr>
+        <p:style>
+          <a:lnRef idx="2">
+            <a:schemeClr val="accent1">
+              <a:shade val="50000"/>
+            </a:schemeClr>
+          </a:lnRef>
+          <a:fillRef idx="1">
+            <a:schemeClr val="accent1"/>
+          </a:fillRef>
+          <a:effectRef idx="0">
+            <a:schemeClr val="accent1"/>
+          </a:effectRef>
+          <a:fontRef idx="minor">
+            <a:schemeClr val="lt1"/>
+          </a:fontRef>
+        </p:style>
+        <p:txBody>
+          <a:bodyPr rtlCol="0" anchor="ctr"/>
+          <a:lstStyle/>
+          <a:p>
+            <a:pPr algn="ctr"/>
+            <a:r>
+              <a:rPr lang="en-US" b="1" dirty="0"/>
+              <a:t>April 08</a:t>
+            </a:r>
+            <a:br>
+              <a:rPr lang="en-US" dirty="0"/>
+            </a:br>
+            <a:r>
+              <a:rPr lang="en-US" dirty="0"/>
+              <a:t>Recurrent Neural Networks, Embeddings,</a:t>
+            </a:r>
+          </a:p>
+          <a:p>
+            <a:pPr algn="ctr"/>
+            <a:r>
+              <a:rPr lang="en-US" dirty="0"/>
+              <a:t>Autoencoders</a:t>
+            </a:r>
+          </a:p>
+          <a:p>
+            <a:pPr algn="ctr"/>
+            <a:endParaRPr lang="en-US" dirty="0"/>
+          </a:p>
+        </p:txBody>
+      </p:sp>
+      <p:sp>
+        <p:nvSpPr>
+          <p:cNvPr id="17" name="Rectangle : coins arrondis 16">
+            <a:extLst>
+              <a:ext uri="{FF2B5EF4-FFF2-40B4-BE49-F238E27FC236}">
+                <a16:creationId xmlns:a16="http://schemas.microsoft.com/office/drawing/2014/main" id="{D92BAD65-04E2-44E3-9486-B33259A4F925}"/>
+              </a:ext>
+            </a:extLst>
+          </p:cNvPr>
+          <p:cNvSpPr/>
+          <p:nvPr/>
+        </p:nvSpPr>
+        <p:spPr>
+          <a:xfrm>
+            <a:off x="7451102" y="1423358"/>
+            <a:ext cx="1885360" cy="4458968"/>
+          </a:xfrm>
+          <a:prstGeom prst="roundRect">
+            <a:avLst/>
+          </a:prstGeom>
+          <a:solidFill>
+            <a:schemeClr val="accent6">
+              <a:lumMod val="40000"/>
+              <a:lumOff val="60000"/>
+            </a:schemeClr>
+          </a:solidFill>
+          <a:ln>
+            <a:solidFill>
+              <a:schemeClr val="accent6">
+                <a:lumMod val="50000"/>
+              </a:schemeClr>
+            </a:solidFill>
+          </a:ln>
+        </p:spPr>
+        <p:style>
+          <a:lnRef idx="2">
+            <a:schemeClr val="accent1">
+              <a:shade val="50000"/>
+            </a:schemeClr>
+          </a:lnRef>
+          <a:fillRef idx="1">
+            <a:schemeClr val="accent1"/>
+          </a:fillRef>
+          <a:effectRef idx="0">
+            <a:schemeClr val="accent1"/>
+          </a:effectRef>
+          <a:fontRef idx="minor">
+            <a:schemeClr val="lt1"/>
+          </a:fontRef>
+        </p:style>
+        <p:txBody>
+          <a:bodyPr rtlCol="0" anchor="ctr"/>
+          <a:lstStyle/>
+          <a:p>
+            <a:pPr algn="ctr"/>
+            <a:r>
+              <a:rPr lang="en-US" b="1" dirty="0">
+                <a:solidFill>
+                  <a:schemeClr val="tx1"/>
+                </a:solidFill>
+              </a:rPr>
+              <a:t>April 10</a:t>
+            </a:r>
+          </a:p>
+          <a:p>
+            <a:pPr algn="ctr"/>
+            <a:r>
+              <a:rPr lang="en-US" dirty="0">
+                <a:solidFill>
+                  <a:schemeClr val="tx1"/>
+                </a:solidFill>
+              </a:rPr>
+              <a:t>Generative models, Deep reinforcement learning, Concept bottlenecks</a:t>
+            </a:r>
+          </a:p>
+          <a:p>
+            <a:pPr algn="ctr"/>
+            <a:endParaRPr lang="en-US" dirty="0"/>
+          </a:p>
+        </p:txBody>
+      </p:sp>
+      <p:sp>
+        <p:nvSpPr>
+          <p:cNvPr id="18" name="Rectangle : coins arrondis 17">
+            <a:extLst>
+              <a:ext uri="{FF2B5EF4-FFF2-40B4-BE49-F238E27FC236}">
+                <a16:creationId xmlns:a16="http://schemas.microsoft.com/office/drawing/2014/main" id="{6E2582E1-FF05-4F08-87C6-B5411108EE52}"/>
+              </a:ext>
+            </a:extLst>
+          </p:cNvPr>
+          <p:cNvSpPr/>
+          <p:nvPr/>
+        </p:nvSpPr>
+        <p:spPr>
+          <a:xfrm>
+            <a:off x="9724534" y="1423358"/>
+            <a:ext cx="1885360" cy="4458968"/>
+          </a:xfrm>
+          <a:prstGeom prst="roundRect">
+            <a:avLst/>
+          </a:prstGeom>
+          <a:solidFill>
+            <a:schemeClr val="accent6">
+              <a:lumMod val="20000"/>
+              <a:lumOff val="80000"/>
+            </a:schemeClr>
+          </a:solidFill>
+          <a:ln>
+            <a:solidFill>
+              <a:schemeClr val="accent6">
+                <a:lumMod val="50000"/>
+              </a:schemeClr>
+            </a:solidFill>
+          </a:ln>
+        </p:spPr>
+        <p:style>
+          <a:lnRef idx="2">
+            <a:schemeClr val="accent1">
+              <a:shade val="50000"/>
+            </a:schemeClr>
+          </a:lnRef>
+          <a:fillRef idx="1">
+            <a:schemeClr val="accent1"/>
+          </a:fillRef>
+          <a:effectRef idx="0">
+            <a:schemeClr val="accent1"/>
+          </a:effectRef>
+          <a:fontRef idx="minor">
+            <a:schemeClr val="lt1"/>
+          </a:fontRef>
+        </p:style>
+        <p:txBody>
+          <a:bodyPr rtlCol="0" anchor="ctr"/>
+          <a:lstStyle/>
+          <a:p>
+            <a:pPr algn="ctr"/>
+            <a:r>
+              <a:rPr lang="en-US" b="1" dirty="0">
+                <a:solidFill>
+                  <a:schemeClr val="tx1"/>
+                </a:solidFill>
+              </a:rPr>
+              <a:t>April 12</a:t>
+            </a:r>
+          </a:p>
+          <a:p>
+            <a:pPr algn="ctr"/>
+            <a:r>
+              <a:rPr lang="en-US" dirty="0">
+                <a:solidFill>
+                  <a:schemeClr val="tx1"/>
+                </a:solidFill>
+              </a:rPr>
+              <a:t>Project and/or advanced topics (Physics-informed Neural Networks, Hybrid models, Neural-symbolic AI, Causality)</a:t>
+            </a:r>
+          </a:p>
+        </p:txBody>
+      </p:sp>
+      <p:sp>
+        <p:nvSpPr>
+          <p:cNvPr id="10" name="Bulle narrative : rectangle 9">
+            <a:extLst>
+              <a:ext uri="{FF2B5EF4-FFF2-40B4-BE49-F238E27FC236}">
+                <a16:creationId xmlns:a16="http://schemas.microsoft.com/office/drawing/2014/main" id="{D4BA9B88-F076-43A6-BB75-D53600509014}"/>
+              </a:ext>
+            </a:extLst>
+          </p:cNvPr>
+          <p:cNvSpPr/>
+          <p:nvPr/>
+        </p:nvSpPr>
+        <p:spPr>
+          <a:xfrm>
+            <a:off x="3149337" y="1112362"/>
+            <a:ext cx="5665510" cy="1885361"/>
+          </a:xfrm>
+          <a:prstGeom prst="wedgeRectCallout">
+            <a:avLst>
+              <a:gd name="adj1" fmla="val 83451"/>
+              <a:gd name="adj2" fmla="val -9666"/>
+            </a:avLst>
+          </a:prstGeom>
+        </p:spPr>
+        <p:style>
+          <a:lnRef idx="2">
+            <a:schemeClr val="dk1"/>
+          </a:lnRef>
+          <a:fillRef idx="1">
+            <a:schemeClr val="lt1"/>
+          </a:fillRef>
+          <a:effectRef idx="0">
+            <a:schemeClr val="dk1"/>
+          </a:effectRef>
+          <a:fontRef idx="minor">
+            <a:schemeClr val="dk1"/>
+          </a:fontRef>
+        </p:style>
+        <p:txBody>
+          <a:bodyPr rtlCol="0" anchor="ctr"/>
+          <a:lstStyle/>
+          <a:p>
+            <a:pPr algn="ctr"/>
+            <a:r>
+              <a:rPr lang="en-US" sz="2400" dirty="0"/>
+              <a:t>April 12, 10:00-12:00</a:t>
+            </a:r>
+          </a:p>
+          <a:p>
+            <a:pPr algn="ctr"/>
+            <a:r>
+              <a:rPr lang="en-US" sz="2400" i="1" dirty="0"/>
+              <a:t>Relational Concept Bottleneck Models</a:t>
+            </a:r>
+          </a:p>
+          <a:p>
+            <a:pPr algn="ctr"/>
+            <a:r>
+              <a:rPr lang="en-US" sz="2400" b="1" dirty="0"/>
+              <a:t>Pietro </a:t>
+            </a:r>
+            <a:r>
+              <a:rPr lang="en-US" sz="2400" b="1" dirty="0" err="1"/>
+              <a:t>Barbiero</a:t>
+            </a:r>
+            <a:r>
+              <a:rPr lang="en-US" sz="2400" dirty="0"/>
+              <a:t> (Cambridge, UK and Univ. </a:t>
+            </a:r>
+            <a:r>
+              <a:rPr lang="en-US" sz="2400" dirty="0" err="1"/>
+              <a:t>della</a:t>
+            </a:r>
+            <a:r>
+              <a:rPr lang="en-US" sz="2400" dirty="0"/>
+              <a:t> </a:t>
+            </a:r>
+            <a:r>
+              <a:rPr lang="en-US" sz="2400" dirty="0" err="1"/>
+              <a:t>Svizzera</a:t>
+            </a:r>
+            <a:r>
+              <a:rPr lang="en-US" sz="2400" dirty="0"/>
+              <a:t> </a:t>
+            </a:r>
+            <a:r>
+              <a:rPr lang="en-US" sz="2400" dirty="0" err="1"/>
+              <a:t>Italiana</a:t>
+            </a:r>
+            <a:r>
+              <a:rPr lang="en-US" sz="2400" dirty="0"/>
+              <a:t>, Switzerland)</a:t>
+            </a:r>
+          </a:p>
+        </p:txBody>
+      </p:sp>
+      <p:sp>
+        <p:nvSpPr>
+          <p:cNvPr id="19" name="Bulle narrative : rectangle 18">
+            <a:extLst>
+              <a:ext uri="{FF2B5EF4-FFF2-40B4-BE49-F238E27FC236}">
+                <a16:creationId xmlns:a16="http://schemas.microsoft.com/office/drawing/2014/main" id="{270A8EC9-15BE-49F9-B3C7-847241402EEF}"/>
+              </a:ext>
+            </a:extLst>
+          </p:cNvPr>
+          <p:cNvSpPr/>
+          <p:nvPr/>
+        </p:nvSpPr>
+        <p:spPr>
+          <a:xfrm>
+            <a:off x="5367777" y="4707161"/>
+            <a:ext cx="3026005" cy="930068"/>
+          </a:xfrm>
+          <a:prstGeom prst="wedgeRectCallout">
+            <a:avLst>
+              <a:gd name="adj1" fmla="val -90615"/>
+              <a:gd name="adj2" fmla="val -67851"/>
+            </a:avLst>
+          </a:prstGeom>
+        </p:spPr>
+        <p:style>
+          <a:lnRef idx="2">
+            <a:schemeClr val="dk1"/>
+          </a:lnRef>
+          <a:fillRef idx="1">
+            <a:schemeClr val="lt1"/>
+          </a:fillRef>
+          <a:effectRef idx="0">
+            <a:schemeClr val="dk1"/>
+          </a:effectRef>
+          <a:fontRef idx="minor">
+            <a:schemeClr val="dk1"/>
+          </a:fontRef>
+        </p:style>
+        <p:txBody>
+          <a:bodyPr rtlCol="0" anchor="ctr"/>
+          <a:lstStyle/>
+          <a:p>
+            <a:pPr algn="ctr"/>
+            <a:r>
+              <a:rPr lang="en-US" sz="2800" dirty="0"/>
+              <a:t>“Buffer” day</a:t>
+            </a:r>
+          </a:p>
+        </p:txBody>
+      </p:sp>
+    </p:spTree>
+    <p:extLst>
+      <p:ext uri="{BB962C8B-B14F-4D97-AF65-F5344CB8AC3E}">
+        <p14:creationId xmlns:p14="http://schemas.microsoft.com/office/powerpoint/2010/main" val="2254307127"/>
+      </p:ext>
+    </p:extLst>
+  </p:cSld>
+  <p:clrMapOvr>
+    <a:masterClrMapping/>
+  </p:clrMapOvr>
+</p:sld>
+</file>
+
+<file path=ppt/slides/slide18.xml><?xml version="1.0" encoding="utf-8"?>
 <p:sld xmlns:a="http://schemas.openxmlformats.org/drawingml/2006/main" xmlns:r="http://schemas.openxmlformats.org/officeDocument/2006/relationships" xmlns:p="http://schemas.openxmlformats.org/presentationml/2006/main">
   <p:cSld>
     <p:spTree>
@@ -5583,10 +6207,10 @@
           <p:nvPr/>
         </p:nvPicPr>
         <p:blipFill rotWithShape="1">
-          <a:blip r:embed="rId3" cstate="screen">
+          <a:blip r:embed="rId3" cstate="print">
             <a:extLst>
               <a:ext uri="{28A0092B-C50C-407E-A947-70E740481C1C}">
-                <a14:useLocalDpi xmlns:a14="http://schemas.microsoft.com/office/drawing/2010/main"/>
+                <a14:useLocalDpi xmlns:a14="http://schemas.microsoft.com/office/drawing/2010/main" val="0"/>
               </a:ext>
             </a:extLst>
           </a:blip>
@@ -6237,7 +6861,7 @@
           <a:blip r:embed="rId2" cstate="screen">
             <a:extLst>
               <a:ext uri="{28A0092B-C50C-407E-A947-70E740481C1C}">
-                <a14:useLocalDpi xmlns:a14="http://schemas.microsoft.com/office/drawing/2010/main"/>
+                <a14:useLocalDpi xmlns:a14="http://schemas.microsoft.com/office/drawing/2010/main" val="0"/>
               </a:ext>
             </a:extLst>
           </a:blip>

</xml_diff>

<commit_message>
Corrections in the slides for the first class
</commit_message>
<xml_diff>
--- a/deep-learning-in-practice-with-pytorch/0-introduction.pptx
+++ b/deep-learning-in-practice-with-pytorch/0-introduction.pptx
@@ -215,7 +215,7 @@
           <a:p>
             <a:fld id="{C8652949-E600-4D43-A26B-20271E89D95E}" type="datetimeFigureOut">
               <a:rPr lang="en-US" smtClean="0"/>
-              <a:t>4/1/2024</a:t>
+              <a:t>4/2/2024</a:t>
             </a:fld>
             <a:endParaRPr lang="en-US"/>
           </a:p>
@@ -561,6 +561,97 @@
     <p:extLst>
       <p:ext uri="{BB962C8B-B14F-4D97-AF65-F5344CB8AC3E}">
         <p14:creationId xmlns:p14="http://schemas.microsoft.com/office/powerpoint/2010/main" val="1467895713"/>
+      </p:ext>
+    </p:extLst>
+  </p:cSld>
+  <p:clrMapOvr>
+    <a:masterClrMapping/>
+  </p:clrMapOvr>
+</p:notes>
+</file>
+
+<file path=ppt/notesSlides/notesSlide2.xml><?xml version="1.0" encoding="utf-8"?>
+<p:notes xmlns:a="http://schemas.openxmlformats.org/drawingml/2006/main" xmlns:r="http://schemas.openxmlformats.org/officeDocument/2006/relationships" xmlns:p="http://schemas.openxmlformats.org/presentationml/2006/main">
+  <p:cSld>
+    <p:spTree>
+      <p:nvGrpSpPr>
+        <p:cNvPr id="1" name=""/>
+        <p:cNvGrpSpPr/>
+        <p:nvPr/>
+      </p:nvGrpSpPr>
+      <p:grpSpPr>
+        <a:xfrm>
+          <a:off x="0" y="0"/>
+          <a:ext cx="0" cy="0"/>
+          <a:chOff x="0" y="0"/>
+          <a:chExt cx="0" cy="0"/>
+        </a:xfrm>
+      </p:grpSpPr>
+      <p:sp>
+        <p:nvSpPr>
+          <p:cNvPr id="2" name="Espace réservé de l'image des diapositives 1"/>
+          <p:cNvSpPr>
+            <a:spLocks noGrp="1" noRot="1" noChangeAspect="1"/>
+          </p:cNvSpPr>
+          <p:nvPr>
+            <p:ph type="sldImg"/>
+          </p:nvPr>
+        </p:nvSpPr>
+        <p:spPr/>
+      </p:sp>
+      <p:sp>
+        <p:nvSpPr>
+          <p:cNvPr id="3" name="Espace réservé des notes 2"/>
+          <p:cNvSpPr>
+            <a:spLocks noGrp="1"/>
+          </p:cNvSpPr>
+          <p:nvPr>
+            <p:ph type="body" idx="1"/>
+          </p:nvPr>
+        </p:nvSpPr>
+        <p:spPr/>
+        <p:txBody>
+          <a:bodyPr/>
+          <a:lstStyle/>
+          <a:p>
+            <a:r>
+              <a:rPr lang="en-US" dirty="0"/>
+              <a:t>Technical check: can everybody access the e-campus page? Otherwise, send slides and links </a:t>
+            </a:r>
+            <a:r>
+              <a:rPr lang="en-US"/>
+              <a:t>by email</a:t>
+            </a:r>
+          </a:p>
+        </p:txBody>
+      </p:sp>
+      <p:sp>
+        <p:nvSpPr>
+          <p:cNvPr id="4" name="Espace réservé du numéro de diapositive 3"/>
+          <p:cNvSpPr>
+            <a:spLocks noGrp="1"/>
+          </p:cNvSpPr>
+          <p:nvPr>
+            <p:ph type="sldNum" sz="quarter" idx="5"/>
+          </p:nvPr>
+        </p:nvSpPr>
+        <p:spPr/>
+        <p:txBody>
+          <a:bodyPr/>
+          <a:lstStyle/>
+          <a:p>
+            <a:fld id="{1ED0F5F0-C710-453A-93D6-BF09378256D4}" type="slidenum">
+              <a:rPr lang="en-US" smtClean="0"/>
+              <a:t>19</a:t>
+            </a:fld>
+            <a:endParaRPr lang="en-US"/>
+          </a:p>
+        </p:txBody>
+      </p:sp>
+    </p:spTree>
+    <p:extLst>
+      <p:ext uri="{BB962C8B-B14F-4D97-AF65-F5344CB8AC3E}">
+        <p14:creationId xmlns:p14="http://schemas.microsoft.com/office/powerpoint/2010/main" val="1050921465"/>
       </p:ext>
     </p:extLst>
   </p:cSld>
@@ -6164,7 +6255,7 @@
           <p:nvPr/>
         </p:nvPicPr>
         <p:blipFill>
-          <a:blip r:embed="rId2">
+          <a:blip r:embed="rId3">
             <a:extLst>
               <a:ext uri="{28A0092B-C50C-407E-A947-70E740481C1C}">
                 <a14:useLocalDpi xmlns:a14="http://schemas.microsoft.com/office/drawing/2010/main" val="0"/>
@@ -6256,7 +6347,7 @@
             </a:r>
             <a:r>
               <a:rPr lang="en-US" dirty="0">
-                <a:hlinkClick r:id="rId3"/>
+                <a:hlinkClick r:id="rId4"/>
               </a:rPr>
               <a:t>https://vguigue.github.io/</a:t>
             </a:r>
@@ -6282,7 +6373,7 @@
           <p:nvPr/>
         </p:nvPicPr>
         <p:blipFill>
-          <a:blip r:embed="rId4">
+          <a:blip r:embed="rId5">
             <a:extLst>
               <a:ext uri="{28A0092B-C50C-407E-A947-70E740481C1C}">
                 <a14:useLocalDpi xmlns:a14="http://schemas.microsoft.com/office/drawing/2010/main" val="0"/>
@@ -6329,7 +6420,7 @@
           <p:nvPr/>
         </p:nvPicPr>
         <p:blipFill>
-          <a:blip r:embed="rId5" cstate="print">
+          <a:blip r:embed="rId6" cstate="print">
             <a:extLst>
               <a:ext uri="{28A0092B-C50C-407E-A947-70E740481C1C}">
                 <a14:useLocalDpi xmlns:a14="http://schemas.microsoft.com/office/drawing/2010/main" val="0"/>
@@ -6396,7 +6487,7 @@
             </a:r>
             <a:r>
               <a:rPr lang="en-US" dirty="0">
-                <a:hlinkClick r:id="rId6"/>
+                <a:hlinkClick r:id="rId7"/>
               </a:rPr>
               <a:t>https://jxmo.io/deep-learning-workshop/</a:t>
             </a:r>
@@ -6410,7 +6501,7 @@
             </a:r>
             <a:r>
               <a:rPr lang="en-US" dirty="0">
-                <a:hlinkClick r:id="rId7"/>
+                <a:hlinkClick r:id="rId8"/>
               </a:rPr>
               <a:t>https://udlbook.github.io/udlbook/</a:t>
             </a:r>
@@ -6432,7 +6523,7 @@
             </a:r>
             <a:r>
               <a:rPr lang="en-US" dirty="0">
-                <a:hlinkClick r:id="rId8"/>
+                <a:hlinkClick r:id="rId9"/>
               </a:rPr>
               <a:t>https://github.com/deep-learning-with-pytorch/</a:t>
             </a:r>
@@ -6455,7 +6546,7 @@
           <p:nvPr/>
         </p:nvPicPr>
         <p:blipFill>
-          <a:blip r:embed="rId9" cstate="print">
+          <a:blip r:embed="rId10" cstate="print">
             <a:extLst>
               <a:ext uri="{28A0092B-C50C-407E-A947-70E740481C1C}">
                 <a14:useLocalDpi xmlns:a14="http://schemas.microsoft.com/office/drawing/2010/main" val="0"/>

</xml_diff>

<commit_message>
Class updated to 2024
</commit_message>
<xml_diff>
--- a/deep-learning-in-practice-with-pytorch/0-introduction.pptx
+++ b/deep-learning-in-practice-with-pytorch/0-introduction.pptx
@@ -5,7 +5,7 @@
     <p:sldMasterId id="2147483648" r:id="rId1"/>
   </p:sldMasterIdLst>
   <p:notesMasterIdLst>
-    <p:notesMasterId r:id="rId21"/>
+    <p:notesMasterId r:id="rId24"/>
   </p:notesMasterIdLst>
   <p:sldIdLst>
     <p:sldId id="257" r:id="rId2"/>
@@ -15,18 +15,21 @@
     <p:sldId id="267" r:id="rId6"/>
     <p:sldId id="299" r:id="rId7"/>
     <p:sldId id="294" r:id="rId8"/>
-    <p:sldId id="261" r:id="rId9"/>
-    <p:sldId id="262" r:id="rId10"/>
-    <p:sldId id="263" r:id="rId11"/>
-    <p:sldId id="296" r:id="rId12"/>
-    <p:sldId id="297" r:id="rId13"/>
-    <p:sldId id="298" r:id="rId14"/>
-    <p:sldId id="300" r:id="rId15"/>
-    <p:sldId id="266" r:id="rId16"/>
-    <p:sldId id="302" r:id="rId17"/>
-    <p:sldId id="305" r:id="rId18"/>
-    <p:sldId id="304" r:id="rId19"/>
-    <p:sldId id="301" r:id="rId20"/>
+    <p:sldId id="307" r:id="rId9"/>
+    <p:sldId id="261" r:id="rId10"/>
+    <p:sldId id="311" r:id="rId11"/>
+    <p:sldId id="262" r:id="rId12"/>
+    <p:sldId id="263" r:id="rId13"/>
+    <p:sldId id="296" r:id="rId14"/>
+    <p:sldId id="297" r:id="rId15"/>
+    <p:sldId id="298" r:id="rId16"/>
+    <p:sldId id="300" r:id="rId17"/>
+    <p:sldId id="266" r:id="rId18"/>
+    <p:sldId id="306" r:id="rId19"/>
+    <p:sldId id="308" r:id="rId20"/>
+    <p:sldId id="310" r:id="rId21"/>
+    <p:sldId id="309" r:id="rId22"/>
+    <p:sldId id="301" r:id="rId23"/>
   </p:sldIdLst>
   <p:sldSz cx="12192000" cy="6858000"/>
   <p:notesSz cx="6858000" cy="9144000"/>
@@ -215,7 +218,7 @@
           <a:p>
             <a:fld id="{C8652949-E600-4D43-A26B-20271E89D95E}" type="datetimeFigureOut">
               <a:rPr lang="en-US" smtClean="0"/>
-              <a:t>4/2/2024</a:t>
+              <a:t>12/1/2024</a:t>
             </a:fld>
             <a:endParaRPr lang="en-US"/>
           </a:p>
@@ -642,7 +645,7 @@
           <a:p>
             <a:fld id="{1ED0F5F0-C710-453A-93D6-BF09378256D4}" type="slidenum">
               <a:rPr lang="en-US" smtClean="0"/>
-              <a:t>19</a:t>
+              <a:t>22</a:t>
             </a:fld>
             <a:endParaRPr lang="en-US"/>
           </a:p>
@@ -2374,7 +2377,14 @@
           <a:p>
             <a:r>
               <a:rPr lang="it-IT" sz="7200" dirty="0"/>
-              <a:t>Introduction to Deep Learning in Practice with pytorch</a:t>
+              <a:t>Introduction to </a:t>
+            </a:r>
+            <a:br>
+              <a:rPr lang="it-IT" sz="7200" dirty="0"/>
+            </a:br>
+            <a:r>
+              <a:rPr lang="it-IT" sz="7200" dirty="0"/>
+              <a:t>Deep Learning in Practice with pytorch</a:t>
             </a:r>
             <a:endParaRPr lang="fr-FR" sz="7200" dirty="0"/>
           </a:p>
@@ -2495,6 +2505,452 @@
       </p:sp>
       <p:sp>
         <p:nvSpPr>
+          <p:cNvPr id="4" name="Flèche droite rayée 3"/>
+          <p:cNvSpPr/>
+          <p:nvPr/>
+        </p:nvSpPr>
+        <p:spPr>
+          <a:xfrm>
+            <a:off x="484632" y="5020056"/>
+            <a:ext cx="11411712" cy="795528"/>
+          </a:xfrm>
+          <a:prstGeom prst="stripedRightArrow">
+            <a:avLst/>
+          </a:prstGeom>
+          <a:gradFill flip="none" rotWithShape="1">
+            <a:gsLst>
+              <a:gs pos="0">
+                <a:schemeClr val="accent1">
+                  <a:lumMod val="50000"/>
+                </a:schemeClr>
+              </a:gs>
+              <a:gs pos="26000">
+                <a:schemeClr val="accent1"/>
+              </a:gs>
+              <a:gs pos="83000">
+                <a:schemeClr val="accent1">
+                  <a:lumMod val="40000"/>
+                  <a:lumOff val="60000"/>
+                </a:schemeClr>
+              </a:gs>
+              <a:gs pos="100000">
+                <a:schemeClr val="accent1">
+                  <a:lumMod val="20000"/>
+                  <a:lumOff val="80000"/>
+                </a:schemeClr>
+              </a:gs>
+            </a:gsLst>
+            <a:lin ang="10800000" scaled="1"/>
+            <a:tileRect/>
+          </a:gradFill>
+          <a:ln>
+            <a:solidFill>
+              <a:schemeClr val="accent1">
+                <a:lumMod val="50000"/>
+              </a:schemeClr>
+            </a:solidFill>
+          </a:ln>
+        </p:spPr>
+        <p:style>
+          <a:lnRef idx="2">
+            <a:schemeClr val="accent2">
+              <a:shade val="50000"/>
+            </a:schemeClr>
+          </a:lnRef>
+          <a:fillRef idx="1">
+            <a:schemeClr val="accent2"/>
+          </a:fillRef>
+          <a:effectRef idx="0">
+            <a:schemeClr val="accent2"/>
+          </a:effectRef>
+          <a:fontRef idx="minor">
+            <a:schemeClr val="lt1"/>
+          </a:fontRef>
+        </p:style>
+        <p:txBody>
+          <a:bodyPr rtlCol="0" anchor="ctr"/>
+          <a:lstStyle/>
+          <a:p>
+            <a:pPr algn="ctr"/>
+            <a:endParaRPr lang="en-US" dirty="0"/>
+          </a:p>
+        </p:txBody>
+      </p:sp>
+      <p:sp>
+        <p:nvSpPr>
+          <p:cNvPr id="12" name="Rectangle 4">
+            <a:extLst>
+              <a:ext uri="{FF2B5EF4-FFF2-40B4-BE49-F238E27FC236}">
+                <a16:creationId xmlns:a16="http://schemas.microsoft.com/office/drawing/2014/main" id="{C1A4D46E-7D36-4BCD-BBBE-E789EFC5AD9C}"/>
+              </a:ext>
+            </a:extLst>
+          </p:cNvPr>
+          <p:cNvSpPr/>
+          <p:nvPr/>
+        </p:nvSpPr>
+        <p:spPr>
+          <a:xfrm>
+            <a:off x="1523998" y="1837944"/>
+            <a:ext cx="3132309" cy="1491302"/>
+          </a:xfrm>
+          <a:prstGeom prst="wedgeRectCallout">
+            <a:avLst>
+              <a:gd name="adj1" fmla="val -6216"/>
+              <a:gd name="adj2" fmla="val 184450"/>
+            </a:avLst>
+          </a:prstGeom>
+          <a:solidFill>
+            <a:schemeClr val="accent1">
+              <a:lumMod val="40000"/>
+              <a:lumOff val="60000"/>
+            </a:schemeClr>
+          </a:solidFill>
+          <a:ln>
+            <a:solidFill>
+              <a:schemeClr val="accent1"/>
+            </a:solidFill>
+          </a:ln>
+        </p:spPr>
+        <p:style>
+          <a:lnRef idx="2">
+            <a:schemeClr val="accent2">
+              <a:shade val="50000"/>
+            </a:schemeClr>
+          </a:lnRef>
+          <a:fillRef idx="1">
+            <a:schemeClr val="accent2"/>
+          </a:fillRef>
+          <a:effectRef idx="0">
+            <a:schemeClr val="accent2"/>
+          </a:effectRef>
+          <a:fontRef idx="minor">
+            <a:schemeClr val="lt1"/>
+          </a:fontRef>
+        </p:style>
+        <p:txBody>
+          <a:bodyPr rtlCol="0" anchor="ctr"/>
+          <a:lstStyle/>
+          <a:p>
+            <a:pPr algn="ctr"/>
+            <a:r>
+              <a:rPr lang="en-US" sz="2800" b="1" dirty="0">
+                <a:solidFill>
+                  <a:schemeClr val="tx1"/>
+                </a:solidFill>
+              </a:rPr>
+              <a:t>November 2023</a:t>
+            </a:r>
+          </a:p>
+          <a:p>
+            <a:pPr algn="ctr"/>
+            <a:r>
+              <a:rPr lang="en-US" sz="2800" dirty="0">
+                <a:solidFill>
+                  <a:schemeClr val="tx1"/>
+                </a:solidFill>
+              </a:rPr>
+              <a:t>Musk’s </a:t>
+            </a:r>
+            <a:r>
+              <a:rPr lang="en-US" sz="2800" dirty="0" err="1">
+                <a:solidFill>
+                  <a:schemeClr val="tx1"/>
+                </a:solidFill>
+              </a:rPr>
+              <a:t>xAI</a:t>
+            </a:r>
+            <a:r>
+              <a:rPr lang="en-US" sz="2800" dirty="0">
+                <a:solidFill>
+                  <a:schemeClr val="tx1"/>
+                </a:solidFill>
+              </a:rPr>
+              <a:t> releases Grok</a:t>
+            </a:r>
+          </a:p>
+        </p:txBody>
+      </p:sp>
+      <p:sp>
+        <p:nvSpPr>
+          <p:cNvPr id="5" name="Rectangle 4"/>
+          <p:cNvSpPr/>
+          <p:nvPr/>
+        </p:nvSpPr>
+        <p:spPr>
+          <a:xfrm>
+            <a:off x="262645" y="3429000"/>
+            <a:ext cx="3132309" cy="1491302"/>
+          </a:xfrm>
+          <a:prstGeom prst="wedgeRectCallout">
+            <a:avLst>
+              <a:gd name="adj1" fmla="val -30129"/>
+              <a:gd name="adj2" fmla="val 74865"/>
+            </a:avLst>
+          </a:prstGeom>
+          <a:solidFill>
+            <a:schemeClr val="accent1">
+              <a:lumMod val="20000"/>
+              <a:lumOff val="80000"/>
+            </a:schemeClr>
+          </a:solidFill>
+          <a:ln>
+            <a:solidFill>
+              <a:schemeClr val="accent1"/>
+            </a:solidFill>
+          </a:ln>
+        </p:spPr>
+        <p:style>
+          <a:lnRef idx="2">
+            <a:schemeClr val="accent2">
+              <a:shade val="50000"/>
+            </a:schemeClr>
+          </a:lnRef>
+          <a:fillRef idx="1">
+            <a:schemeClr val="accent2"/>
+          </a:fillRef>
+          <a:effectRef idx="0">
+            <a:schemeClr val="accent2"/>
+          </a:effectRef>
+          <a:fontRef idx="minor">
+            <a:schemeClr val="lt1"/>
+          </a:fontRef>
+        </p:style>
+        <p:txBody>
+          <a:bodyPr rtlCol="0" anchor="ctr"/>
+          <a:lstStyle/>
+          <a:p>
+            <a:pPr algn="ctr"/>
+            <a:r>
+              <a:rPr lang="en-US" sz="2800" b="1" dirty="0">
+                <a:solidFill>
+                  <a:schemeClr val="tx1"/>
+                </a:solidFill>
+              </a:rPr>
+              <a:t>July 2023</a:t>
+            </a:r>
+          </a:p>
+          <a:p>
+            <a:pPr algn="ctr"/>
+            <a:r>
+              <a:rPr lang="en-US" sz="2800" dirty="0">
+                <a:solidFill>
+                  <a:schemeClr val="tx1"/>
+                </a:solidFill>
+              </a:rPr>
+              <a:t>Meta releases Llama 2, open LLM</a:t>
+            </a:r>
+          </a:p>
+        </p:txBody>
+      </p:sp>
+      <p:sp>
+        <p:nvSpPr>
+          <p:cNvPr id="13" name="Rectangle 4">
+            <a:extLst>
+              <a:ext uri="{FF2B5EF4-FFF2-40B4-BE49-F238E27FC236}">
+                <a16:creationId xmlns:a16="http://schemas.microsoft.com/office/drawing/2014/main" id="{DA1ED3A7-D72B-4284-82DA-A7CCBD6ED456}"/>
+              </a:ext>
+            </a:extLst>
+          </p:cNvPr>
+          <p:cNvSpPr/>
+          <p:nvPr/>
+        </p:nvSpPr>
+        <p:spPr>
+          <a:xfrm>
+            <a:off x="3592747" y="3429000"/>
+            <a:ext cx="3132309" cy="1491302"/>
+          </a:xfrm>
+          <a:prstGeom prst="wedgeRectCallout">
+            <a:avLst>
+              <a:gd name="adj1" fmla="val -42551"/>
+              <a:gd name="adj2" fmla="val 89215"/>
+            </a:avLst>
+          </a:prstGeom>
+          <a:solidFill>
+            <a:schemeClr val="accent1">
+              <a:lumMod val="60000"/>
+              <a:lumOff val="40000"/>
+            </a:schemeClr>
+          </a:solidFill>
+          <a:ln>
+            <a:solidFill>
+              <a:schemeClr val="accent1"/>
+            </a:solidFill>
+          </a:ln>
+        </p:spPr>
+        <p:style>
+          <a:lnRef idx="2">
+            <a:schemeClr val="accent2">
+              <a:shade val="50000"/>
+            </a:schemeClr>
+          </a:lnRef>
+          <a:fillRef idx="1">
+            <a:schemeClr val="accent2"/>
+          </a:fillRef>
+          <a:effectRef idx="0">
+            <a:schemeClr val="accent2"/>
+          </a:effectRef>
+          <a:fontRef idx="minor">
+            <a:schemeClr val="lt1"/>
+          </a:fontRef>
+        </p:style>
+        <p:txBody>
+          <a:bodyPr rtlCol="0" anchor="ctr"/>
+          <a:lstStyle/>
+          <a:p>
+            <a:pPr algn="ctr"/>
+            <a:r>
+              <a:rPr lang="en-US" sz="2800" b="1" dirty="0">
+                <a:solidFill>
+                  <a:schemeClr val="tx1"/>
+                </a:solidFill>
+              </a:rPr>
+              <a:t>December 2023</a:t>
+            </a:r>
+          </a:p>
+          <a:p>
+            <a:pPr algn="ctr"/>
+            <a:r>
+              <a:rPr lang="en-US" sz="2800" dirty="0">
+                <a:solidFill>
+                  <a:schemeClr val="tx1"/>
+                </a:solidFill>
+              </a:rPr>
+              <a:t>Google releases Gemini</a:t>
+            </a:r>
+          </a:p>
+        </p:txBody>
+      </p:sp>
+      <p:sp>
+        <p:nvSpPr>
+          <p:cNvPr id="14" name="Rectangle 4">
+            <a:extLst>
+              <a:ext uri="{FF2B5EF4-FFF2-40B4-BE49-F238E27FC236}">
+                <a16:creationId xmlns:a16="http://schemas.microsoft.com/office/drawing/2014/main" id="{287D1ABC-C97D-4C7C-B8C1-7F5AF70CB32A}"/>
+              </a:ext>
+            </a:extLst>
+          </p:cNvPr>
+          <p:cNvSpPr/>
+          <p:nvPr/>
+        </p:nvSpPr>
+        <p:spPr>
+          <a:xfrm>
+            <a:off x="6922849" y="2683349"/>
+            <a:ext cx="3132309" cy="1491302"/>
+          </a:xfrm>
+          <a:prstGeom prst="wedgeRectCallout">
+            <a:avLst>
+              <a:gd name="adj1" fmla="val 55586"/>
+              <a:gd name="adj2" fmla="val 136180"/>
+            </a:avLst>
+          </a:prstGeom>
+          <a:solidFill>
+            <a:schemeClr val="accent1">
+              <a:lumMod val="50000"/>
+            </a:schemeClr>
+          </a:solidFill>
+          <a:ln>
+            <a:solidFill>
+              <a:schemeClr val="accent1"/>
+            </a:solidFill>
+          </a:ln>
+        </p:spPr>
+        <p:style>
+          <a:lnRef idx="2">
+            <a:schemeClr val="accent2">
+              <a:shade val="50000"/>
+            </a:schemeClr>
+          </a:lnRef>
+          <a:fillRef idx="1">
+            <a:schemeClr val="accent2"/>
+          </a:fillRef>
+          <a:effectRef idx="0">
+            <a:schemeClr val="accent2"/>
+          </a:effectRef>
+          <a:fontRef idx="minor">
+            <a:schemeClr val="lt1"/>
+          </a:fontRef>
+        </p:style>
+        <p:txBody>
+          <a:bodyPr rtlCol="0" anchor="ctr"/>
+          <a:lstStyle/>
+          <a:p>
+            <a:pPr algn="ctr"/>
+            <a:r>
+              <a:rPr lang="en-US" sz="2800" b="1" dirty="0">
+                <a:solidFill>
+                  <a:schemeClr val="bg1"/>
+                </a:solidFill>
+              </a:rPr>
+              <a:t>November 2024</a:t>
+            </a:r>
+          </a:p>
+          <a:p>
+            <a:pPr algn="ctr"/>
+            <a:r>
+              <a:rPr lang="en-US" sz="2800" dirty="0">
+                <a:solidFill>
+                  <a:schemeClr val="bg1"/>
+                </a:solidFill>
+              </a:rPr>
+              <a:t>Time-test tuning</a:t>
+            </a:r>
+          </a:p>
+        </p:txBody>
+      </p:sp>
+    </p:spTree>
+    <p:extLst>
+      <p:ext uri="{BB962C8B-B14F-4D97-AF65-F5344CB8AC3E}">
+        <p14:creationId xmlns:p14="http://schemas.microsoft.com/office/powerpoint/2010/main" val="1854380022"/>
+      </p:ext>
+    </p:extLst>
+  </p:cSld>
+  <p:clrMapOvr>
+    <a:masterClrMapping/>
+  </p:clrMapOvr>
+</p:sld>
+</file>
+
+<file path=ppt/slides/slide11.xml><?xml version="1.0" encoding="utf-8"?>
+<p:sld xmlns:a="http://schemas.openxmlformats.org/drawingml/2006/main" xmlns:r="http://schemas.openxmlformats.org/officeDocument/2006/relationships" xmlns:p="http://schemas.openxmlformats.org/presentationml/2006/main">
+  <p:cSld>
+    <p:spTree>
+      <p:nvGrpSpPr>
+        <p:cNvPr id="1" name=""/>
+        <p:cNvGrpSpPr/>
+        <p:nvPr/>
+      </p:nvGrpSpPr>
+      <p:grpSpPr>
+        <a:xfrm>
+          <a:off x="0" y="0"/>
+          <a:ext cx="0" cy="0"/>
+          <a:chOff x="0" y="0"/>
+          <a:chExt cx="0" cy="0"/>
+        </a:xfrm>
+      </p:grpSpPr>
+      <p:sp>
+        <p:nvSpPr>
+          <p:cNvPr id="2" name="Titre 1"/>
+          <p:cNvSpPr>
+            <a:spLocks noGrp="1"/>
+          </p:cNvSpPr>
+          <p:nvPr>
+            <p:ph type="title"/>
+          </p:nvPr>
+        </p:nvSpPr>
+        <p:spPr/>
+        <p:txBody>
+          <a:bodyPr/>
+          <a:lstStyle/>
+          <a:p>
+            <a:r>
+              <a:rPr lang="en-US" dirty="0"/>
+              <a:t>Current state of the field</a:t>
+            </a:r>
+          </a:p>
+        </p:txBody>
+      </p:sp>
+      <p:sp>
+        <p:nvSpPr>
           <p:cNvPr id="3" name="Espace réservé du texte 2"/>
           <p:cNvSpPr>
             <a:spLocks noGrp="1"/>
@@ -2510,6 +2966,152 @@
           <a:p>
             <a:r>
               <a:rPr lang="en-US" dirty="0"/>
+              <a:t>Large availability of open</a:t>
+            </a:r>
+            <a:r>
+              <a:rPr lang="en-US" i="1" dirty="0"/>
+              <a:t>-</a:t>
+            </a:r>
+            <a:r>
+              <a:rPr lang="en-US" i="1" dirty="0" err="1"/>
+              <a:t>ish</a:t>
+            </a:r>
+            <a:r>
+              <a:rPr lang="en-US" dirty="0"/>
+              <a:t> source tools</a:t>
+            </a:r>
+          </a:p>
+          <a:p>
+            <a:pPr lvl="1"/>
+            <a:r>
+              <a:rPr lang="en-US" dirty="0"/>
+              <a:t>The open source movement in computer science is strong</a:t>
+            </a:r>
+          </a:p>
+          <a:p>
+            <a:pPr lvl="1"/>
+            <a:r>
+              <a:rPr lang="en-US" dirty="0"/>
+              <a:t>It’s useful for companies to have other people use their code</a:t>
+            </a:r>
+          </a:p>
+          <a:p>
+            <a:pPr lvl="1"/>
+            <a:r>
+              <a:rPr lang="en-US" dirty="0"/>
+              <a:t>For deep learning, it started with </a:t>
+            </a:r>
+            <a:r>
+              <a:rPr lang="en-US" dirty="0" err="1"/>
+              <a:t>Tensorflow</a:t>
+            </a:r>
+            <a:r>
+              <a:rPr lang="en-US" dirty="0"/>
+              <a:t>, 2017 (Google)</a:t>
+            </a:r>
+          </a:p>
+          <a:p>
+            <a:endParaRPr lang="en-US" dirty="0"/>
+          </a:p>
+          <a:p>
+            <a:r>
+              <a:rPr lang="en-US" dirty="0"/>
+              <a:t>General Purpose Graphic Processing Units (GPGPUs)</a:t>
+            </a:r>
+          </a:p>
+          <a:p>
+            <a:pPr lvl="1"/>
+            <a:r>
+              <a:rPr lang="en-US" dirty="0"/>
+              <a:t>GPUs originally created for gaming, lots of processors (low-spec)</a:t>
+            </a:r>
+          </a:p>
+          <a:p>
+            <a:pPr lvl="1"/>
+            <a:r>
+              <a:rPr lang="en-US" dirty="0"/>
+              <a:t>Great for </a:t>
+            </a:r>
+            <a:r>
+              <a:rPr lang="en-US" i="1" dirty="0"/>
+              <a:t>massive parallelization</a:t>
+            </a:r>
+            <a:r>
+              <a:rPr lang="en-US" dirty="0"/>
+              <a:t> of simple computations</a:t>
+            </a:r>
+          </a:p>
+        </p:txBody>
+      </p:sp>
+    </p:spTree>
+    <p:extLst>
+      <p:ext uri="{BB962C8B-B14F-4D97-AF65-F5344CB8AC3E}">
+        <p14:creationId xmlns:p14="http://schemas.microsoft.com/office/powerpoint/2010/main" val="3344303874"/>
+      </p:ext>
+    </p:extLst>
+  </p:cSld>
+  <p:clrMapOvr>
+    <a:masterClrMapping/>
+  </p:clrMapOvr>
+</p:sld>
+</file>
+
+<file path=ppt/slides/slide12.xml><?xml version="1.0" encoding="utf-8"?>
+<p:sld xmlns:a="http://schemas.openxmlformats.org/drawingml/2006/main" xmlns:r="http://schemas.openxmlformats.org/officeDocument/2006/relationships" xmlns:p="http://schemas.openxmlformats.org/presentationml/2006/main">
+  <p:cSld>
+    <p:spTree>
+      <p:nvGrpSpPr>
+        <p:cNvPr id="1" name=""/>
+        <p:cNvGrpSpPr/>
+        <p:nvPr/>
+      </p:nvGrpSpPr>
+      <p:grpSpPr>
+        <a:xfrm>
+          <a:off x="0" y="0"/>
+          <a:ext cx="0" cy="0"/>
+          <a:chOff x="0" y="0"/>
+          <a:chExt cx="0" cy="0"/>
+        </a:xfrm>
+      </p:grpSpPr>
+      <p:sp>
+        <p:nvSpPr>
+          <p:cNvPr id="2" name="Titre 1"/>
+          <p:cNvSpPr>
+            <a:spLocks noGrp="1"/>
+          </p:cNvSpPr>
+          <p:nvPr>
+            <p:ph type="title"/>
+          </p:nvPr>
+        </p:nvSpPr>
+        <p:spPr/>
+        <p:txBody>
+          <a:bodyPr/>
+          <a:lstStyle/>
+          <a:p>
+            <a:r>
+              <a:rPr lang="en-US" dirty="0"/>
+              <a:t>Current state of the field</a:t>
+            </a:r>
+          </a:p>
+        </p:txBody>
+      </p:sp>
+      <p:sp>
+        <p:nvSpPr>
+          <p:cNvPr id="3" name="Espace réservé du texte 2"/>
+          <p:cNvSpPr>
+            <a:spLocks noGrp="1"/>
+          </p:cNvSpPr>
+          <p:nvPr>
+            <p:ph type="body" sz="quarter" idx="10"/>
+          </p:nvPr>
+        </p:nvSpPr>
+        <p:spPr/>
+        <p:txBody>
+          <a:bodyPr/>
+          <a:lstStyle/>
+          <a:p>
+            <a:r>
+              <a:rPr lang="en-US" dirty="0"/>
               <a:t>A vast (unreasonable?) amount of </a:t>
             </a:r>
             <a:r>
@@ -2530,22 +3132,34 @@
           <a:p>
             <a:pPr lvl="1"/>
             <a:r>
-              <a:rPr lang="en-US" dirty="0"/>
-              <a:t>Competition between large companies (Microsoft, Meta, Google)</a:t>
+              <a:rPr lang="en-US" b="1" dirty="0"/>
+              <a:t>Competitio</a:t>
+            </a:r>
+            <a:r>
+              <a:rPr lang="en-US" dirty="0"/>
+              <a:t>n between large companies (Microsoft, Meta, Google)</a:t>
             </a:r>
           </a:p>
           <a:p>
             <a:pPr lvl="1"/>
             <a:r>
-              <a:rPr lang="en-US" dirty="0"/>
-              <a:t>Tools that are relatively accessible to non-experts</a:t>
+              <a:rPr lang="en-US" b="1" dirty="0"/>
+              <a:t>Tools</a:t>
+            </a:r>
+            <a:r>
+              <a:rPr lang="en-US" dirty="0"/>
+              <a:t> that are relatively accessible to non-experts</a:t>
             </a:r>
           </a:p>
           <a:p>
             <a:pPr lvl="1"/>
             <a:r>
               <a:rPr lang="en-US" dirty="0"/>
-              <a:t>Considerable amount of passionate practitioners</a:t>
+              <a:t>Considerable amount of </a:t>
+            </a:r>
+            <a:r>
+              <a:rPr lang="en-US" b="1" dirty="0"/>
+              <a:t>passionate practitioners</a:t>
             </a:r>
           </a:p>
           <a:p>
@@ -2605,7 +3219,7 @@
 </p:sld>
 </file>
 
-<file path=ppt/slides/slide11.xml><?xml version="1.0" encoding="utf-8"?>
+<file path=ppt/slides/slide13.xml><?xml version="1.0" encoding="utf-8"?>
 <p:sld xmlns:a="http://schemas.openxmlformats.org/drawingml/2006/main" xmlns:r="http://schemas.openxmlformats.org/officeDocument/2006/relationships" xmlns:p="http://schemas.openxmlformats.org/presentationml/2006/main">
   <p:cSld>
     <p:spTree>
@@ -3156,7 +3770,7 @@
 </p:sld>
 </file>
 
-<file path=ppt/slides/slide12.xml><?xml version="1.0" encoding="utf-8"?>
+<file path=ppt/slides/slide14.xml><?xml version="1.0" encoding="utf-8"?>
 <p:sld xmlns:a="http://schemas.openxmlformats.org/drawingml/2006/main" xmlns:r="http://schemas.openxmlformats.org/officeDocument/2006/relationships" xmlns:p="http://schemas.openxmlformats.org/presentationml/2006/main">
   <p:cSld>
     <p:spTree>
@@ -3294,7 +3908,7 @@
 </p:sld>
 </file>
 
-<file path=ppt/slides/slide13.xml><?xml version="1.0" encoding="utf-8"?>
+<file path=ppt/slides/slide15.xml><?xml version="1.0" encoding="utf-8"?>
 <p:sld xmlns:a="http://schemas.openxmlformats.org/drawingml/2006/main" xmlns:r="http://schemas.openxmlformats.org/officeDocument/2006/relationships" xmlns:p="http://schemas.openxmlformats.org/presentationml/2006/main">
   <p:cSld>
     <p:spTree>
@@ -3478,7 +4092,7 @@
 </p:sld>
 </file>
 
-<file path=ppt/slides/slide14.xml><?xml version="1.0" encoding="utf-8"?>
+<file path=ppt/slides/slide16.xml><?xml version="1.0" encoding="utf-8"?>
 <p:sld xmlns:a="http://schemas.openxmlformats.org/drawingml/2006/main" xmlns:r="http://schemas.openxmlformats.org/officeDocument/2006/relationships" xmlns:p="http://schemas.openxmlformats.org/presentationml/2006/main">
   <p:cSld>
     <p:spTree>
@@ -3766,7 +4380,7 @@
 </p:sld>
 </file>
 
-<file path=ppt/slides/slide15.xml><?xml version="1.0" encoding="utf-8"?>
+<file path=ppt/slides/slide17.xml><?xml version="1.0" encoding="utf-8"?>
 <p:sld xmlns:a="http://schemas.openxmlformats.org/drawingml/2006/main" xmlns:r="http://schemas.openxmlformats.org/officeDocument/2006/relationships" xmlns:p="http://schemas.openxmlformats.org/presentationml/2006/main">
   <p:cSld>
     <p:spTree>
@@ -3894,7 +4508,7 @@
             <a:pPr algn="ctr"/>
             <a:r>
               <a:rPr lang="en-US" b="1" dirty="0"/>
-              <a:t>April 02</a:t>
+              <a:t>December 02</a:t>
             </a:r>
             <a:br>
               <a:rPr lang="en-US" dirty="0"/>
@@ -3976,7 +4590,7 @@
             <a:pPr algn="ctr"/>
             <a:r>
               <a:rPr lang="en-US" b="1" dirty="0"/>
-              <a:t>April 04</a:t>
+              <a:t>December 04</a:t>
             </a:r>
             <a:br>
               <a:rPr lang="en-US" dirty="0"/>
@@ -4045,7 +4659,7 @@
             <a:pPr algn="ctr"/>
             <a:r>
               <a:rPr lang="en-US" b="1" dirty="0"/>
-              <a:t>April 08</a:t>
+              <a:t>December 06</a:t>
             </a:r>
             <a:br>
               <a:rPr lang="en-US" dirty="0"/>
@@ -4129,7 +4743,7 @@
                   <a:schemeClr val="tx1"/>
                 </a:solidFill>
               </a:rPr>
-              <a:t>April 10</a:t>
+              <a:t>December 09</a:t>
             </a:r>
           </a:p>
           <a:p>
@@ -4210,7 +4824,7 @@
                   <a:schemeClr val="tx1"/>
                 </a:solidFill>
               </a:rPr>
-              <a:t>April 12</a:t>
+              <a:t>December 11</a:t>
             </a:r>
           </a:p>
           <a:p>
@@ -4239,7 +4853,7 @@
 </p:sld>
 </file>
 
-<file path=ppt/slides/slide16.xml><?xml version="1.0" encoding="utf-8"?>
+<file path=ppt/slides/slide18.xml><?xml version="1.0" encoding="utf-8"?>
 <p:sld xmlns:a="http://schemas.openxmlformats.org/drawingml/2006/main" xmlns:r="http://schemas.openxmlformats.org/officeDocument/2006/relationships" xmlns:p="http://schemas.openxmlformats.org/presentationml/2006/main">
   <p:cSld>
     <p:spTree>
@@ -4258,10 +4872,65 @@
       </p:grpSpPr>
       <p:sp>
         <p:nvSpPr>
-          <p:cNvPr id="13" name="Rectangle : coins arrondis 12">
-            <a:extLst>
-              <a:ext uri="{FF2B5EF4-FFF2-40B4-BE49-F238E27FC236}">
-                <a16:creationId xmlns:a16="http://schemas.microsoft.com/office/drawing/2014/main" id="{8599907B-B1AF-490F-B54B-BC169006C180}"/>
+          <p:cNvPr id="2" name="Titre 1">
+            <a:extLst>
+              <a:ext uri="{FF2B5EF4-FFF2-40B4-BE49-F238E27FC236}">
+                <a16:creationId xmlns:a16="http://schemas.microsoft.com/office/drawing/2014/main" id="{563510CA-3994-440D-9624-DEF4A6B4D263}"/>
+              </a:ext>
+            </a:extLst>
+          </p:cNvPr>
+          <p:cNvSpPr>
+            <a:spLocks noGrp="1"/>
+          </p:cNvSpPr>
+          <p:nvPr>
+            <p:ph type="title"/>
+          </p:nvPr>
+        </p:nvSpPr>
+        <p:spPr/>
+        <p:txBody>
+          <a:bodyPr>
+            <a:normAutofit/>
+          </a:bodyPr>
+          <a:lstStyle/>
+          <a:p>
+            <a:r>
+              <a:rPr lang="en-US" dirty="0"/>
+              <a:t>(Tentative) Planning</a:t>
+            </a:r>
+          </a:p>
+        </p:txBody>
+      </p:sp>
+      <p:sp>
+        <p:nvSpPr>
+          <p:cNvPr id="3" name="Espace réservé du texte 2">
+            <a:extLst>
+              <a:ext uri="{FF2B5EF4-FFF2-40B4-BE49-F238E27FC236}">
+                <a16:creationId xmlns:a16="http://schemas.microsoft.com/office/drawing/2014/main" id="{CDF58B45-85FA-4108-AA84-5A31C0552D03}"/>
+              </a:ext>
+            </a:extLst>
+          </p:cNvPr>
+          <p:cNvSpPr>
+            <a:spLocks noGrp="1"/>
+          </p:cNvSpPr>
+          <p:nvPr>
+            <p:ph type="body" sz="quarter" idx="10"/>
+          </p:nvPr>
+        </p:nvSpPr>
+        <p:spPr/>
+        <p:txBody>
+          <a:bodyPr/>
+          <a:lstStyle/>
+          <a:p>
+            <a:endParaRPr lang="en-US" dirty="0"/>
+          </a:p>
+        </p:txBody>
+      </p:sp>
+      <p:sp>
+        <p:nvSpPr>
+          <p:cNvPr id="4" name="Rectangle : coins arrondis 3">
+            <a:extLst>
+              <a:ext uri="{FF2B5EF4-FFF2-40B4-BE49-F238E27FC236}">
+                <a16:creationId xmlns:a16="http://schemas.microsoft.com/office/drawing/2014/main" id="{B50E40AE-B061-4015-AD26-DD07FB8047D6}"/>
               </a:ext>
             </a:extLst>
           </p:cNvPr>
@@ -4312,7 +4981,7 @@
             <a:pPr algn="ctr"/>
             <a:r>
               <a:rPr lang="en-US" b="1" dirty="0"/>
-              <a:t>April 02</a:t>
+              <a:t>December 02</a:t>
             </a:r>
             <a:br>
               <a:rPr lang="en-US" dirty="0"/>
@@ -4340,10 +5009,10 @@
       </p:sp>
       <p:sp>
         <p:nvSpPr>
-          <p:cNvPr id="14" name="Rectangle : coins arrondis 13">
-            <a:extLst>
-              <a:ext uri="{FF2B5EF4-FFF2-40B4-BE49-F238E27FC236}">
-                <a16:creationId xmlns:a16="http://schemas.microsoft.com/office/drawing/2014/main" id="{C1B09DAC-BF03-4263-B0AA-EE9AA4363A9F}"/>
+          <p:cNvPr id="5" name="Rectangle : coins arrondis 4">
+            <a:extLst>
+              <a:ext uri="{FF2B5EF4-FFF2-40B4-BE49-F238E27FC236}">
+                <a16:creationId xmlns:a16="http://schemas.microsoft.com/office/drawing/2014/main" id="{927828C2-D2D1-4745-A760-DE543579A63B}"/>
               </a:ext>
             </a:extLst>
           </p:cNvPr>
@@ -4394,7 +5063,7 @@
             <a:pPr algn="ctr"/>
             <a:r>
               <a:rPr lang="en-US" b="1" dirty="0"/>
-              <a:t>April 04</a:t>
+              <a:t>December 04</a:t>
             </a:r>
             <a:br>
               <a:rPr lang="en-US" dirty="0"/>
@@ -4408,10 +5077,10 @@
       </p:sp>
       <p:sp>
         <p:nvSpPr>
-          <p:cNvPr id="15" name="Rectangle : coins arrondis 14">
-            <a:extLst>
-              <a:ext uri="{FF2B5EF4-FFF2-40B4-BE49-F238E27FC236}">
-                <a16:creationId xmlns:a16="http://schemas.microsoft.com/office/drawing/2014/main" id="{E9AB8ACA-8B9D-4A69-B9C7-CB229148662A}"/>
+          <p:cNvPr id="6" name="Rectangle : coins arrondis 5">
+            <a:extLst>
+              <a:ext uri="{FF2B5EF4-FFF2-40B4-BE49-F238E27FC236}">
+                <a16:creationId xmlns:a16="http://schemas.microsoft.com/office/drawing/2014/main" id="{0EFCF3FA-5F5F-4A88-A1BF-99B1CB79B13D}"/>
               </a:ext>
             </a:extLst>
           </p:cNvPr>
@@ -4463,7 +5132,7 @@
             <a:pPr algn="ctr"/>
             <a:r>
               <a:rPr lang="en-US" b="1" dirty="0"/>
-              <a:t>April 08</a:t>
+              <a:t>December 06</a:t>
             </a:r>
             <a:br>
               <a:rPr lang="en-US" dirty="0"/>
@@ -4488,10 +5157,10 @@
       </p:sp>
       <p:sp>
         <p:nvSpPr>
-          <p:cNvPr id="16" name="Rectangle : coins arrondis 15">
-            <a:extLst>
-              <a:ext uri="{FF2B5EF4-FFF2-40B4-BE49-F238E27FC236}">
-                <a16:creationId xmlns:a16="http://schemas.microsoft.com/office/drawing/2014/main" id="{B02F0317-2B92-4D43-98BD-F74DB5151E08}"/>
+          <p:cNvPr id="7" name="Rectangle : coins arrondis 6">
+            <a:extLst>
+              <a:ext uri="{FF2B5EF4-FFF2-40B4-BE49-F238E27FC236}">
+                <a16:creationId xmlns:a16="http://schemas.microsoft.com/office/drawing/2014/main" id="{3AD48CF9-87DC-4C66-92EC-8A3B98F62C0B}"/>
               </a:ext>
             </a:extLst>
           </p:cNvPr>
@@ -4547,7 +5216,7 @@
                   <a:schemeClr val="tx1"/>
                 </a:solidFill>
               </a:rPr>
-              <a:t>April 10</a:t>
+              <a:t>December 09</a:t>
             </a:r>
           </a:p>
           <a:p>
@@ -4569,10 +5238,10 @@
       </p:sp>
       <p:sp>
         <p:nvSpPr>
-          <p:cNvPr id="17" name="Rectangle : coins arrondis 16">
-            <a:extLst>
-              <a:ext uri="{FF2B5EF4-FFF2-40B4-BE49-F238E27FC236}">
-                <a16:creationId xmlns:a16="http://schemas.microsoft.com/office/drawing/2014/main" id="{D6FF4C34-2A37-42DF-9F01-8D7F86FEE0D6}"/>
+          <p:cNvPr id="8" name="Rectangle : coins arrondis 7">
+            <a:extLst>
+              <a:ext uri="{FF2B5EF4-FFF2-40B4-BE49-F238E27FC236}">
+                <a16:creationId xmlns:a16="http://schemas.microsoft.com/office/drawing/2014/main" id="{42DB3220-30E7-4BB7-9332-1FB053E084B2}"/>
               </a:ext>
             </a:extLst>
           </p:cNvPr>
@@ -4628,7 +5297,7 @@
                   <a:schemeClr val="tx1"/>
                 </a:solidFill>
               </a:rPr>
-              <a:t>April 12</a:t>
+              <a:t>December 11</a:t>
             </a:r>
           </a:p>
           <a:p>
@@ -4644,42 +5313,12 @@
           </a:p>
         </p:txBody>
       </p:sp>
-      <p:sp>
-        <p:nvSpPr>
-          <p:cNvPr id="2" name="Titre 1">
-            <a:extLst>
-              <a:ext uri="{FF2B5EF4-FFF2-40B4-BE49-F238E27FC236}">
-                <a16:creationId xmlns:a16="http://schemas.microsoft.com/office/drawing/2014/main" id="{563510CA-3994-440D-9624-DEF4A6B4D263}"/>
-              </a:ext>
-            </a:extLst>
-          </p:cNvPr>
-          <p:cNvSpPr>
-            <a:spLocks noGrp="1"/>
-          </p:cNvSpPr>
-          <p:nvPr>
-            <p:ph type="title"/>
-          </p:nvPr>
-        </p:nvSpPr>
-        <p:spPr/>
-        <p:txBody>
-          <a:bodyPr>
-            <a:normAutofit/>
-          </a:bodyPr>
-          <a:lstStyle/>
-          <a:p>
-            <a:r>
-              <a:rPr lang="en-US" dirty="0"/>
-              <a:t>(Tentative) Planning</a:t>
-            </a:r>
-          </a:p>
-        </p:txBody>
-      </p:sp>
       <p:pic>
         <p:nvPicPr>
-          <p:cNvPr id="1028" name="Picture 4" descr="Attention Sign PNG - 160756">
-            <a:extLst>
-              <a:ext uri="{FF2B5EF4-FFF2-40B4-BE49-F238E27FC236}">
-                <a16:creationId xmlns:a16="http://schemas.microsoft.com/office/drawing/2014/main" id="{DE5BA303-FCFD-4DA3-B270-38663D06568A}"/>
+          <p:cNvPr id="9" name="Picture 4" descr="Attention Sign PNG - 160756">
+            <a:extLst>
+              <a:ext uri="{FF2B5EF4-FFF2-40B4-BE49-F238E27FC236}">
+                <a16:creationId xmlns:a16="http://schemas.microsoft.com/office/drawing/2014/main" id="{DD70234B-B2C5-4D03-8B3D-53EF87DCC9D6}"/>
               </a:ext>
             </a:extLst>
           </p:cNvPr>
@@ -4723,10 +5362,10 @@
       </p:pic>
       <p:sp>
         <p:nvSpPr>
-          <p:cNvPr id="9" name="Bulle narrative : rectangle 8">
-            <a:extLst>
-              <a:ext uri="{FF2B5EF4-FFF2-40B4-BE49-F238E27FC236}">
-                <a16:creationId xmlns:a16="http://schemas.microsoft.com/office/drawing/2014/main" id="{60C31920-7C3A-46FD-A246-1AFB9546D3DC}"/>
+          <p:cNvPr id="10" name="Bulle narrative : rectangle 9">
+            <a:extLst>
+              <a:ext uri="{FF2B5EF4-FFF2-40B4-BE49-F238E27FC236}">
+                <a16:creationId xmlns:a16="http://schemas.microsoft.com/office/drawing/2014/main" id="{D9020F95-C5AA-400B-B403-75BEFB796EF5}"/>
               </a:ext>
             </a:extLst>
           </p:cNvPr>
@@ -4773,10 +5412,10 @@
       </p:sp>
       <p:sp>
         <p:nvSpPr>
-          <p:cNvPr id="12" name="Bulle narrative : rectangle 11">
-            <a:extLst>
-              <a:ext uri="{FF2B5EF4-FFF2-40B4-BE49-F238E27FC236}">
-                <a16:creationId xmlns:a16="http://schemas.microsoft.com/office/drawing/2014/main" id="{8D352777-DCB3-40FB-8D28-1735732FD6E9}"/>
+          <p:cNvPr id="11" name="Bulle narrative : rectangle 10">
+            <a:extLst>
+              <a:ext uri="{FF2B5EF4-FFF2-40B4-BE49-F238E27FC236}">
+                <a16:creationId xmlns:a16="http://schemas.microsoft.com/office/drawing/2014/main" id="{E1766D8C-D2E7-4B2C-85F4-D43B0892507F}"/>
               </a:ext>
             </a:extLst>
           </p:cNvPr>
@@ -4816,7 +5455,7 @@
             <a:pPr algn="ctr"/>
             <a:r>
               <a:rPr lang="en-US" sz="2800" dirty="0"/>
-              <a:t>Expect technical issues</a:t>
+              <a:t>Learning from last year’s class</a:t>
             </a:r>
           </a:p>
         </p:txBody>
@@ -4824,7 +5463,7 @@
     </p:spTree>
     <p:extLst>
       <p:ext uri="{BB962C8B-B14F-4D97-AF65-F5344CB8AC3E}">
-        <p14:creationId xmlns:p14="http://schemas.microsoft.com/office/powerpoint/2010/main" val="1175479935"/>
+        <p14:creationId xmlns:p14="http://schemas.microsoft.com/office/powerpoint/2010/main" val="3369750334"/>
       </p:ext>
     </p:extLst>
   </p:cSld>
@@ -4834,7 +5473,7 @@
 </p:sld>
 </file>
 
-<file path=ppt/slides/slide17.xml><?xml version="1.0" encoding="utf-8"?>
+<file path=ppt/slides/slide19.xml><?xml version="1.0" encoding="utf-8"?>
 <p:sld xmlns:a="http://schemas.openxmlformats.org/drawingml/2006/main" xmlns:r="http://schemas.openxmlformats.org/officeDocument/2006/relationships" xmlns:p="http://schemas.openxmlformats.org/presentationml/2006/main">
   <p:cSld>
     <p:spTree>
@@ -4853,10 +5492,65 @@
       </p:grpSpPr>
       <p:sp>
         <p:nvSpPr>
-          <p:cNvPr id="13" name="Rectangle : coins arrondis 12">
-            <a:extLst>
-              <a:ext uri="{FF2B5EF4-FFF2-40B4-BE49-F238E27FC236}">
-                <a16:creationId xmlns:a16="http://schemas.microsoft.com/office/drawing/2014/main" id="{8599907B-B1AF-490F-B54B-BC169006C180}"/>
+          <p:cNvPr id="2" name="Titre 1">
+            <a:extLst>
+              <a:ext uri="{FF2B5EF4-FFF2-40B4-BE49-F238E27FC236}">
+                <a16:creationId xmlns:a16="http://schemas.microsoft.com/office/drawing/2014/main" id="{563510CA-3994-440D-9624-DEF4A6B4D263}"/>
+              </a:ext>
+            </a:extLst>
+          </p:cNvPr>
+          <p:cNvSpPr>
+            <a:spLocks noGrp="1"/>
+          </p:cNvSpPr>
+          <p:nvPr>
+            <p:ph type="title"/>
+          </p:nvPr>
+        </p:nvSpPr>
+        <p:spPr/>
+        <p:txBody>
+          <a:bodyPr>
+            <a:normAutofit/>
+          </a:bodyPr>
+          <a:lstStyle/>
+          <a:p>
+            <a:r>
+              <a:rPr lang="en-US" dirty="0"/>
+              <a:t>(Tentative) Planning</a:t>
+            </a:r>
+          </a:p>
+        </p:txBody>
+      </p:sp>
+      <p:sp>
+        <p:nvSpPr>
+          <p:cNvPr id="3" name="Espace réservé du texte 2">
+            <a:extLst>
+              <a:ext uri="{FF2B5EF4-FFF2-40B4-BE49-F238E27FC236}">
+                <a16:creationId xmlns:a16="http://schemas.microsoft.com/office/drawing/2014/main" id="{CDF58B45-85FA-4108-AA84-5A31C0552D03}"/>
+              </a:ext>
+            </a:extLst>
+          </p:cNvPr>
+          <p:cNvSpPr>
+            <a:spLocks noGrp="1"/>
+          </p:cNvSpPr>
+          <p:nvPr>
+            <p:ph type="body" sz="quarter" idx="10"/>
+          </p:nvPr>
+        </p:nvSpPr>
+        <p:spPr/>
+        <p:txBody>
+          <a:bodyPr/>
+          <a:lstStyle/>
+          <a:p>
+            <a:endParaRPr lang="en-US" dirty="0"/>
+          </a:p>
+        </p:txBody>
+      </p:sp>
+      <p:sp>
+        <p:nvSpPr>
+          <p:cNvPr id="4" name="Rectangle : coins arrondis 3">
+            <a:extLst>
+              <a:ext uri="{FF2B5EF4-FFF2-40B4-BE49-F238E27FC236}">
+                <a16:creationId xmlns:a16="http://schemas.microsoft.com/office/drawing/2014/main" id="{B50E40AE-B061-4015-AD26-DD07FB8047D6}"/>
               </a:ext>
             </a:extLst>
           </p:cNvPr>
@@ -4907,7 +5601,7 @@
             <a:pPr algn="ctr"/>
             <a:r>
               <a:rPr lang="en-US" b="1" dirty="0"/>
-              <a:t>April 02</a:t>
+              <a:t>December 02</a:t>
             </a:r>
             <a:br>
               <a:rPr lang="en-US" dirty="0"/>
@@ -4935,10 +5629,10 @@
       </p:sp>
       <p:sp>
         <p:nvSpPr>
-          <p:cNvPr id="14" name="Rectangle : coins arrondis 13">
-            <a:extLst>
-              <a:ext uri="{FF2B5EF4-FFF2-40B4-BE49-F238E27FC236}">
-                <a16:creationId xmlns:a16="http://schemas.microsoft.com/office/drawing/2014/main" id="{C1B09DAC-BF03-4263-B0AA-EE9AA4363A9F}"/>
+          <p:cNvPr id="5" name="Rectangle : coins arrondis 4">
+            <a:extLst>
+              <a:ext uri="{FF2B5EF4-FFF2-40B4-BE49-F238E27FC236}">
+                <a16:creationId xmlns:a16="http://schemas.microsoft.com/office/drawing/2014/main" id="{927828C2-D2D1-4745-A760-DE543579A63B}"/>
               </a:ext>
             </a:extLst>
           </p:cNvPr>
@@ -4989,7 +5683,7 @@
             <a:pPr algn="ctr"/>
             <a:r>
               <a:rPr lang="en-US" b="1" dirty="0"/>
-              <a:t>April 04</a:t>
+              <a:t>December 04</a:t>
             </a:r>
             <a:br>
               <a:rPr lang="en-US" dirty="0"/>
@@ -5003,10 +5697,10 @@
       </p:sp>
       <p:sp>
         <p:nvSpPr>
-          <p:cNvPr id="15" name="Rectangle : coins arrondis 14">
-            <a:extLst>
-              <a:ext uri="{FF2B5EF4-FFF2-40B4-BE49-F238E27FC236}">
-                <a16:creationId xmlns:a16="http://schemas.microsoft.com/office/drawing/2014/main" id="{E9AB8ACA-8B9D-4A69-B9C7-CB229148662A}"/>
+          <p:cNvPr id="6" name="Rectangle : coins arrondis 5">
+            <a:extLst>
+              <a:ext uri="{FF2B5EF4-FFF2-40B4-BE49-F238E27FC236}">
+                <a16:creationId xmlns:a16="http://schemas.microsoft.com/office/drawing/2014/main" id="{0EFCF3FA-5F5F-4A88-A1BF-99B1CB79B13D}"/>
               </a:ext>
             </a:extLst>
           </p:cNvPr>
@@ -5058,7 +5752,7 @@
             <a:pPr algn="ctr"/>
             <a:r>
               <a:rPr lang="en-US" b="1" dirty="0"/>
-              <a:t>April 08</a:t>
+              <a:t>December 06</a:t>
             </a:r>
             <a:br>
               <a:rPr lang="en-US" dirty="0"/>
@@ -5083,10 +5777,10 @@
       </p:sp>
       <p:sp>
         <p:nvSpPr>
-          <p:cNvPr id="16" name="Rectangle : coins arrondis 15">
-            <a:extLst>
-              <a:ext uri="{FF2B5EF4-FFF2-40B4-BE49-F238E27FC236}">
-                <a16:creationId xmlns:a16="http://schemas.microsoft.com/office/drawing/2014/main" id="{B02F0317-2B92-4D43-98BD-F74DB5151E08}"/>
+          <p:cNvPr id="7" name="Rectangle : coins arrondis 6">
+            <a:extLst>
+              <a:ext uri="{FF2B5EF4-FFF2-40B4-BE49-F238E27FC236}">
+                <a16:creationId xmlns:a16="http://schemas.microsoft.com/office/drawing/2014/main" id="{3AD48CF9-87DC-4C66-92EC-8A3B98F62C0B}"/>
               </a:ext>
             </a:extLst>
           </p:cNvPr>
@@ -5142,7 +5836,7 @@
                   <a:schemeClr val="tx1"/>
                 </a:solidFill>
               </a:rPr>
-              <a:t>April 10</a:t>
+              <a:t>December 09</a:t>
             </a:r>
           </a:p>
           <a:p>
@@ -5164,10 +5858,10 @@
       </p:sp>
       <p:sp>
         <p:nvSpPr>
-          <p:cNvPr id="17" name="Rectangle : coins arrondis 16">
-            <a:extLst>
-              <a:ext uri="{FF2B5EF4-FFF2-40B4-BE49-F238E27FC236}">
-                <a16:creationId xmlns:a16="http://schemas.microsoft.com/office/drawing/2014/main" id="{D6FF4C34-2A37-42DF-9F01-8D7F86FEE0D6}"/>
+          <p:cNvPr id="8" name="Rectangle : coins arrondis 7">
+            <a:extLst>
+              <a:ext uri="{FF2B5EF4-FFF2-40B4-BE49-F238E27FC236}">
+                <a16:creationId xmlns:a16="http://schemas.microsoft.com/office/drawing/2014/main" id="{42DB3220-30E7-4BB7-9332-1FB053E084B2}"/>
               </a:ext>
             </a:extLst>
           </p:cNvPr>
@@ -5223,7 +5917,7 @@
                   <a:schemeClr val="tx1"/>
                 </a:solidFill>
               </a:rPr>
-              <a:t>April 12</a:t>
+              <a:t>December 11</a:t>
             </a:r>
           </a:p>
           <a:p>
@@ -5239,42 +5933,12 @@
           </a:p>
         </p:txBody>
       </p:sp>
-      <p:sp>
-        <p:nvSpPr>
-          <p:cNvPr id="2" name="Titre 1">
-            <a:extLst>
-              <a:ext uri="{FF2B5EF4-FFF2-40B4-BE49-F238E27FC236}">
-                <a16:creationId xmlns:a16="http://schemas.microsoft.com/office/drawing/2014/main" id="{563510CA-3994-440D-9624-DEF4A6B4D263}"/>
-              </a:ext>
-            </a:extLst>
-          </p:cNvPr>
-          <p:cNvSpPr>
-            <a:spLocks noGrp="1"/>
-          </p:cNvSpPr>
-          <p:nvPr>
-            <p:ph type="title"/>
-          </p:nvPr>
-        </p:nvSpPr>
-        <p:spPr/>
-        <p:txBody>
-          <a:bodyPr>
-            <a:normAutofit/>
-          </a:bodyPr>
-          <a:lstStyle/>
-          <a:p>
-            <a:r>
-              <a:rPr lang="en-US" dirty="0"/>
-              <a:t>(Tentative) Planning</a:t>
-            </a:r>
-          </a:p>
-        </p:txBody>
-      </p:sp>
       <p:pic>
         <p:nvPicPr>
-          <p:cNvPr id="1028" name="Picture 4" descr="Attention Sign PNG - 160756">
-            <a:extLst>
-              <a:ext uri="{FF2B5EF4-FFF2-40B4-BE49-F238E27FC236}">
-                <a16:creationId xmlns:a16="http://schemas.microsoft.com/office/drawing/2014/main" id="{DE5BA303-FCFD-4DA3-B270-38663D06568A}"/>
+          <p:cNvPr id="9" name="Picture 4" descr="Attention Sign PNG - 160756">
+            <a:extLst>
+              <a:ext uri="{FF2B5EF4-FFF2-40B4-BE49-F238E27FC236}">
+                <a16:creationId xmlns:a16="http://schemas.microsoft.com/office/drawing/2014/main" id="{597F6C80-5488-4EE5-9DCC-B8AA53013F98}"/>
               </a:ext>
             </a:extLst>
           </p:cNvPr>
@@ -5318,10 +5982,10 @@
       </p:pic>
       <p:sp>
         <p:nvSpPr>
-          <p:cNvPr id="9" name="Bulle narrative : rectangle 8">
-            <a:extLst>
-              <a:ext uri="{FF2B5EF4-FFF2-40B4-BE49-F238E27FC236}">
-                <a16:creationId xmlns:a16="http://schemas.microsoft.com/office/drawing/2014/main" id="{60C31920-7C3A-46FD-A246-1AFB9546D3DC}"/>
+          <p:cNvPr id="10" name="Bulle narrative : rectangle 9">
+            <a:extLst>
+              <a:ext uri="{FF2B5EF4-FFF2-40B4-BE49-F238E27FC236}">
+                <a16:creationId xmlns:a16="http://schemas.microsoft.com/office/drawing/2014/main" id="{E7490E76-5AB2-46B3-9062-FCE33393F457}"/>
               </a:ext>
             </a:extLst>
           </p:cNvPr>
@@ -5365,7 +6029,7 @@
             </a:r>
             <a:r>
               <a:rPr lang="en-US" sz="2800" b="1" dirty="0"/>
-              <a:t>Thursday 04/04</a:t>
+              <a:t>Monday 09/12</a:t>
             </a:r>
             <a:r>
               <a:rPr lang="en-US" sz="2800" dirty="0"/>
@@ -5377,7 +6041,7 @@
             </a:r>
             <a:r>
               <a:rPr lang="en-US" sz="2800" b="1" dirty="0"/>
-              <a:t> 1</a:t>
+              <a:t> III</a:t>
             </a:r>
             <a:r>
               <a:rPr lang="en-US" sz="2800" dirty="0"/>
@@ -5388,10 +6052,10 @@
       </p:sp>
       <p:sp>
         <p:nvSpPr>
-          <p:cNvPr id="3" name="Rectangle 2">
-            <a:extLst>
-              <a:ext uri="{FF2B5EF4-FFF2-40B4-BE49-F238E27FC236}">
-                <a16:creationId xmlns:a16="http://schemas.microsoft.com/office/drawing/2014/main" id="{3E932A8A-57E4-4A85-9437-4E16A99A5097}"/>
+          <p:cNvPr id="11" name="Rectangle 10">
+            <a:extLst>
+              <a:ext uri="{FF2B5EF4-FFF2-40B4-BE49-F238E27FC236}">
+                <a16:creationId xmlns:a16="http://schemas.microsoft.com/office/drawing/2014/main" id="{7447829F-2E24-4AAF-8B3F-F0196F25204E}"/>
               </a:ext>
             </a:extLst>
           </p:cNvPr>
@@ -5458,7 +6122,7 @@
                   <a:schemeClr val="tx1"/>
                 </a:solidFill>
               </a:rPr>
-              <a:t> 7</a:t>
+              <a:t> e.068</a:t>
             </a:r>
             <a:r>
               <a:rPr lang="en-US" sz="2800" dirty="0">
@@ -5474,7 +6138,7 @@
     </p:spTree>
     <p:extLst>
       <p:ext uri="{BB962C8B-B14F-4D97-AF65-F5344CB8AC3E}">
-        <p14:creationId xmlns:p14="http://schemas.microsoft.com/office/powerpoint/2010/main" val="3963656263"/>
+        <p14:creationId xmlns:p14="http://schemas.microsoft.com/office/powerpoint/2010/main" val="3046057613"/>
       </p:ext>
     </p:extLst>
   </p:cSld>
@@ -5484,7 +6148,7 @@
 </p:sld>
 </file>
 
-<file path=ppt/slides/slide18.xml><?xml version="1.0" encoding="utf-8"?>
+<file path=ppt/slides/slide2.xml><?xml version="1.0" encoding="utf-8"?>
 <p:sld xmlns:a="http://schemas.openxmlformats.org/drawingml/2006/main" xmlns:r="http://schemas.openxmlformats.org/officeDocument/2006/relationships" xmlns:p="http://schemas.openxmlformats.org/presentationml/2006/main">
   <p:cSld>
     <p:spTree>
@@ -5503,13 +6167,7 @@
       </p:grpSpPr>
       <p:sp>
         <p:nvSpPr>
-          <p:cNvPr id="2" name="Titre 1">
-            <a:extLst>
-              <a:ext uri="{FF2B5EF4-FFF2-40B4-BE49-F238E27FC236}">
-                <a16:creationId xmlns:a16="http://schemas.microsoft.com/office/drawing/2014/main" id="{563510CA-3994-440D-9624-DEF4A6B4D263}"/>
-              </a:ext>
-            </a:extLst>
-          </p:cNvPr>
+          <p:cNvPr id="2" name="Titre 1"/>
           <p:cNvSpPr>
             <a:spLocks noGrp="1"/>
           </p:cNvSpPr>
@@ -5519,27 +6177,19 @@
         </p:nvSpPr>
         <p:spPr/>
         <p:txBody>
-          <a:bodyPr>
-            <a:normAutofit/>
-          </a:bodyPr>
-          <a:lstStyle/>
-          <a:p>
-            <a:r>
-              <a:rPr lang="en-US" dirty="0"/>
-              <a:t>(Tentative) Planning</a:t>
-            </a:r>
-          </a:p>
-        </p:txBody>
-      </p:sp>
-      <p:sp>
-        <p:nvSpPr>
-          <p:cNvPr id="13" name="Espace réservé du texte 2">
-            <a:extLst>
-              <a:ext uri="{FF2B5EF4-FFF2-40B4-BE49-F238E27FC236}">
-                <a16:creationId xmlns:a16="http://schemas.microsoft.com/office/drawing/2014/main" id="{718F99E1-3FE9-494B-86BA-5C44D04E17E0}"/>
-              </a:ext>
-            </a:extLst>
-          </p:cNvPr>
+          <a:bodyPr/>
+          <a:lstStyle/>
+          <a:p>
+            <a:r>
+              <a:rPr lang="en-US" dirty="0"/>
+              <a:t>Objective of this class</a:t>
+            </a:r>
+          </a:p>
+        </p:txBody>
+      </p:sp>
+      <p:sp>
+        <p:nvSpPr>
+          <p:cNvPr id="3" name="Espace réservé du texte 2"/>
           <p:cNvSpPr>
             <a:spLocks noGrp="1"/>
           </p:cNvSpPr>
@@ -5547,12 +6197,108 @@
             <p:ph type="body" sz="quarter" idx="10"/>
           </p:nvPr>
         </p:nvSpPr>
-        <p:spPr>
-          <a:xfrm>
-            <a:off x="838200" y="1423358"/>
-            <a:ext cx="10515600" cy="4675817"/>
-          </a:xfrm>
-        </p:spPr>
+        <p:spPr/>
+        <p:txBody>
+          <a:bodyPr>
+            <a:normAutofit/>
+          </a:bodyPr>
+          <a:lstStyle/>
+          <a:p>
+            <a:pPr marL="0" indent="0" algn="ctr">
+              <a:buNone/>
+            </a:pPr>
+            <a:r>
+              <a:rPr lang="en-US" sz="4800" dirty="0"/>
+              <a:t>Overview of deep learning architectures and applications, using </a:t>
+            </a:r>
+            <a:r>
+              <a:rPr lang="en-US" sz="4800" b="1" dirty="0" err="1"/>
+              <a:t>pytorch</a:t>
+            </a:r>
+            <a:r>
+              <a:rPr lang="en-US" sz="4800" dirty="0"/>
+              <a:t> as the support library</a:t>
+            </a:r>
+          </a:p>
+        </p:txBody>
+      </p:sp>
+    </p:spTree>
+    <p:extLst>
+      <p:ext uri="{BB962C8B-B14F-4D97-AF65-F5344CB8AC3E}">
+        <p14:creationId xmlns:p14="http://schemas.microsoft.com/office/powerpoint/2010/main" val="750272096"/>
+      </p:ext>
+    </p:extLst>
+  </p:cSld>
+  <p:clrMapOvr>
+    <a:masterClrMapping/>
+  </p:clrMapOvr>
+</p:sld>
+</file>
+
+<file path=ppt/slides/slide20.xml><?xml version="1.0" encoding="utf-8"?>
+<p:sld xmlns:a="http://schemas.openxmlformats.org/drawingml/2006/main" xmlns:r="http://schemas.openxmlformats.org/officeDocument/2006/relationships" xmlns:p="http://schemas.openxmlformats.org/presentationml/2006/main">
+  <p:cSld>
+    <p:spTree>
+      <p:nvGrpSpPr>
+        <p:cNvPr id="1" name=""/>
+        <p:cNvGrpSpPr/>
+        <p:nvPr/>
+      </p:nvGrpSpPr>
+      <p:grpSpPr>
+        <a:xfrm>
+          <a:off x="0" y="0"/>
+          <a:ext cx="0" cy="0"/>
+          <a:chOff x="0" y="0"/>
+          <a:chExt cx="0" cy="0"/>
+        </a:xfrm>
+      </p:grpSpPr>
+      <p:sp>
+        <p:nvSpPr>
+          <p:cNvPr id="2" name="Titre 1">
+            <a:extLst>
+              <a:ext uri="{FF2B5EF4-FFF2-40B4-BE49-F238E27FC236}">
+                <a16:creationId xmlns:a16="http://schemas.microsoft.com/office/drawing/2014/main" id="{563510CA-3994-440D-9624-DEF4A6B4D263}"/>
+              </a:ext>
+            </a:extLst>
+          </p:cNvPr>
+          <p:cNvSpPr>
+            <a:spLocks noGrp="1"/>
+          </p:cNvSpPr>
+          <p:nvPr>
+            <p:ph type="title"/>
+          </p:nvPr>
+        </p:nvSpPr>
+        <p:spPr/>
+        <p:txBody>
+          <a:bodyPr>
+            <a:normAutofit/>
+          </a:bodyPr>
+          <a:lstStyle/>
+          <a:p>
+            <a:r>
+              <a:rPr lang="en-US" dirty="0"/>
+              <a:t>(Tentative) Planning</a:t>
+            </a:r>
+          </a:p>
+        </p:txBody>
+      </p:sp>
+      <p:sp>
+        <p:nvSpPr>
+          <p:cNvPr id="3" name="Espace réservé du texte 2">
+            <a:extLst>
+              <a:ext uri="{FF2B5EF4-FFF2-40B4-BE49-F238E27FC236}">
+                <a16:creationId xmlns:a16="http://schemas.microsoft.com/office/drawing/2014/main" id="{CDF58B45-85FA-4108-AA84-5A31C0552D03}"/>
+              </a:ext>
+            </a:extLst>
+          </p:cNvPr>
+          <p:cNvSpPr>
+            <a:spLocks noGrp="1"/>
+          </p:cNvSpPr>
+          <p:nvPr>
+            <p:ph type="body" sz="quarter" idx="10"/>
+          </p:nvPr>
+        </p:nvSpPr>
+        <p:spPr/>
         <p:txBody>
           <a:bodyPr/>
           <a:lstStyle/>
@@ -5563,10 +6309,10 @@
       </p:sp>
       <p:sp>
         <p:nvSpPr>
-          <p:cNvPr id="14" name="Rectangle : coins arrondis 13">
-            <a:extLst>
-              <a:ext uri="{FF2B5EF4-FFF2-40B4-BE49-F238E27FC236}">
-                <a16:creationId xmlns:a16="http://schemas.microsoft.com/office/drawing/2014/main" id="{8E9179F8-D187-4E98-9D28-733A80F97B89}"/>
+          <p:cNvPr id="4" name="Rectangle : coins arrondis 3">
+            <a:extLst>
+              <a:ext uri="{FF2B5EF4-FFF2-40B4-BE49-F238E27FC236}">
+                <a16:creationId xmlns:a16="http://schemas.microsoft.com/office/drawing/2014/main" id="{B50E40AE-B061-4015-AD26-DD07FB8047D6}"/>
               </a:ext>
             </a:extLst>
           </p:cNvPr>
@@ -5617,7 +6363,7 @@
             <a:pPr algn="ctr"/>
             <a:r>
               <a:rPr lang="en-US" b="1" dirty="0"/>
-              <a:t>April 02</a:t>
+              <a:t>December 02</a:t>
             </a:r>
             <a:br>
               <a:rPr lang="en-US" dirty="0"/>
@@ -5645,10 +6391,10 @@
       </p:sp>
       <p:sp>
         <p:nvSpPr>
-          <p:cNvPr id="15" name="Rectangle : coins arrondis 14">
-            <a:extLst>
-              <a:ext uri="{FF2B5EF4-FFF2-40B4-BE49-F238E27FC236}">
-                <a16:creationId xmlns:a16="http://schemas.microsoft.com/office/drawing/2014/main" id="{D4FEBA0F-3EE8-4F0C-9A0F-2843F54D9EF7}"/>
+          <p:cNvPr id="5" name="Rectangle : coins arrondis 4">
+            <a:extLst>
+              <a:ext uri="{FF2B5EF4-FFF2-40B4-BE49-F238E27FC236}">
+                <a16:creationId xmlns:a16="http://schemas.microsoft.com/office/drawing/2014/main" id="{927828C2-D2D1-4745-A760-DE543579A63B}"/>
               </a:ext>
             </a:extLst>
           </p:cNvPr>
@@ -5699,7 +6445,7 @@
             <a:pPr algn="ctr"/>
             <a:r>
               <a:rPr lang="en-US" b="1" dirty="0"/>
-              <a:t>April 04</a:t>
+              <a:t>December 04</a:t>
             </a:r>
             <a:br>
               <a:rPr lang="en-US" dirty="0"/>
@@ -5713,10 +6459,10 @@
       </p:sp>
       <p:sp>
         <p:nvSpPr>
-          <p:cNvPr id="16" name="Rectangle : coins arrondis 15">
-            <a:extLst>
-              <a:ext uri="{FF2B5EF4-FFF2-40B4-BE49-F238E27FC236}">
-                <a16:creationId xmlns:a16="http://schemas.microsoft.com/office/drawing/2014/main" id="{3FEA87B9-F6E4-4891-AA8C-C48CDA53F3E9}"/>
+          <p:cNvPr id="6" name="Rectangle : coins arrondis 5">
+            <a:extLst>
+              <a:ext uri="{FF2B5EF4-FFF2-40B4-BE49-F238E27FC236}">
+                <a16:creationId xmlns:a16="http://schemas.microsoft.com/office/drawing/2014/main" id="{0EFCF3FA-5F5F-4A88-A1BF-99B1CB79B13D}"/>
               </a:ext>
             </a:extLst>
           </p:cNvPr>
@@ -5768,7 +6514,7 @@
             <a:pPr algn="ctr"/>
             <a:r>
               <a:rPr lang="en-US" b="1" dirty="0"/>
-              <a:t>April 08</a:t>
+              <a:t>December 06</a:t>
             </a:r>
             <a:br>
               <a:rPr lang="en-US" dirty="0"/>
@@ -5793,10 +6539,10 @@
       </p:sp>
       <p:sp>
         <p:nvSpPr>
-          <p:cNvPr id="17" name="Rectangle : coins arrondis 16">
-            <a:extLst>
-              <a:ext uri="{FF2B5EF4-FFF2-40B4-BE49-F238E27FC236}">
-                <a16:creationId xmlns:a16="http://schemas.microsoft.com/office/drawing/2014/main" id="{D92BAD65-04E2-44E3-9486-B33259A4F925}"/>
+          <p:cNvPr id="7" name="Rectangle : coins arrondis 6">
+            <a:extLst>
+              <a:ext uri="{FF2B5EF4-FFF2-40B4-BE49-F238E27FC236}">
+                <a16:creationId xmlns:a16="http://schemas.microsoft.com/office/drawing/2014/main" id="{3AD48CF9-87DC-4C66-92EC-8A3B98F62C0B}"/>
               </a:ext>
             </a:extLst>
           </p:cNvPr>
@@ -5852,7 +6598,7 @@
                   <a:schemeClr val="tx1"/>
                 </a:solidFill>
               </a:rPr>
-              <a:t>April 10</a:t>
+              <a:t>December 09</a:t>
             </a:r>
           </a:p>
           <a:p>
@@ -5874,10 +6620,10 @@
       </p:sp>
       <p:sp>
         <p:nvSpPr>
-          <p:cNvPr id="18" name="Rectangle : coins arrondis 17">
-            <a:extLst>
-              <a:ext uri="{FF2B5EF4-FFF2-40B4-BE49-F238E27FC236}">
-                <a16:creationId xmlns:a16="http://schemas.microsoft.com/office/drawing/2014/main" id="{6E2582E1-FF05-4F08-87C6-B5411108EE52}"/>
+          <p:cNvPr id="8" name="Rectangle : coins arrondis 7">
+            <a:extLst>
+              <a:ext uri="{FF2B5EF4-FFF2-40B4-BE49-F238E27FC236}">
+                <a16:creationId xmlns:a16="http://schemas.microsoft.com/office/drawing/2014/main" id="{42DB3220-30E7-4BB7-9332-1FB053E084B2}"/>
               </a:ext>
             </a:extLst>
           </p:cNvPr>
@@ -5933,7 +6679,7 @@
                   <a:schemeClr val="tx1"/>
                 </a:solidFill>
               </a:rPr>
-              <a:t>April 12</a:t>
+              <a:t>December 11</a:t>
             </a:r>
           </a:p>
           <a:p>
@@ -5954,7 +6700,7 @@
           <p:cNvPr id="10" name="Bulle narrative : rectangle 9">
             <a:extLst>
               <a:ext uri="{FF2B5EF4-FFF2-40B4-BE49-F238E27FC236}">
-                <a16:creationId xmlns:a16="http://schemas.microsoft.com/office/drawing/2014/main" id="{D4BA9B88-F076-43A6-BB75-D53600509014}"/>
+                <a16:creationId xmlns:a16="http://schemas.microsoft.com/office/drawing/2014/main" id="{E7490E76-5AB2-46B3-9062-FCE33393F457}"/>
               </a:ext>
             </a:extLst>
           </p:cNvPr>
@@ -5963,12 +6709,859 @@
         </p:nvSpPr>
         <p:spPr>
           <a:xfrm>
+            <a:off x="3040926" y="79778"/>
+            <a:ext cx="3026005" cy="1439148"/>
+          </a:xfrm>
+          <a:prstGeom prst="wedgeRectCallout">
+            <a:avLst>
+              <a:gd name="adj1" fmla="val -92485"/>
+              <a:gd name="adj2" fmla="val 78221"/>
+            </a:avLst>
+          </a:prstGeom>
+        </p:spPr>
+        <p:style>
+          <a:lnRef idx="2">
+            <a:schemeClr val="dk1"/>
+          </a:lnRef>
+          <a:fillRef idx="1">
+            <a:schemeClr val="lt1"/>
+          </a:fillRef>
+          <a:effectRef idx="0">
+            <a:schemeClr val="dk1"/>
+          </a:effectRef>
+          <a:fontRef idx="minor">
+            <a:schemeClr val="dk1"/>
+          </a:fontRef>
+        </p:style>
+        <p:txBody>
+          <a:bodyPr rtlCol="0" anchor="ctr"/>
+          <a:lstStyle/>
+          <a:p>
+            <a:pPr algn="ctr"/>
+            <a:r>
+              <a:rPr lang="en-US" sz="2800" dirty="0"/>
+              <a:t>09h30-12h00</a:t>
+            </a:r>
+          </a:p>
+          <a:p>
+            <a:pPr algn="ctr"/>
+            <a:r>
+              <a:rPr lang="en-US" sz="2800" dirty="0"/>
+              <a:t>13h00-15h30</a:t>
+            </a:r>
+          </a:p>
+        </p:txBody>
+      </p:sp>
+      <p:sp>
+        <p:nvSpPr>
+          <p:cNvPr id="12" name="Bulle narrative : rectangle 11">
+            <a:extLst>
+              <a:ext uri="{FF2B5EF4-FFF2-40B4-BE49-F238E27FC236}">
+                <a16:creationId xmlns:a16="http://schemas.microsoft.com/office/drawing/2014/main" id="{EDB75137-30FA-468F-9081-838349DC9005}"/>
+              </a:ext>
+            </a:extLst>
+          </p:cNvPr>
+          <p:cNvSpPr/>
+          <p:nvPr/>
+        </p:nvSpPr>
+        <p:spPr>
+          <a:xfrm>
+            <a:off x="3040925" y="79778"/>
+            <a:ext cx="3026005" cy="1439148"/>
+          </a:xfrm>
+          <a:prstGeom prst="wedgeRectCallout">
+            <a:avLst>
+              <a:gd name="adj1" fmla="val -12423"/>
+              <a:gd name="adj2" fmla="val 90666"/>
+            </a:avLst>
+          </a:prstGeom>
+        </p:spPr>
+        <p:style>
+          <a:lnRef idx="2">
+            <a:schemeClr val="dk1"/>
+          </a:lnRef>
+          <a:fillRef idx="1">
+            <a:schemeClr val="lt1"/>
+          </a:fillRef>
+          <a:effectRef idx="0">
+            <a:schemeClr val="dk1"/>
+          </a:effectRef>
+          <a:fontRef idx="minor">
+            <a:schemeClr val="dk1"/>
+          </a:fontRef>
+        </p:style>
+        <p:txBody>
+          <a:bodyPr rtlCol="0" anchor="ctr"/>
+          <a:lstStyle/>
+          <a:p>
+            <a:pPr algn="ctr"/>
+            <a:r>
+              <a:rPr lang="en-US" sz="2800" dirty="0"/>
+              <a:t>09h30-12h00</a:t>
+            </a:r>
+          </a:p>
+          <a:p>
+            <a:pPr algn="ctr"/>
+            <a:r>
+              <a:rPr lang="en-US" sz="2800" dirty="0"/>
+              <a:t>13h00-15h30</a:t>
+            </a:r>
+          </a:p>
+        </p:txBody>
+      </p:sp>
+      <p:sp>
+        <p:nvSpPr>
+          <p:cNvPr id="13" name="Bulle narrative : rectangle 12">
+            <a:extLst>
+              <a:ext uri="{FF2B5EF4-FFF2-40B4-BE49-F238E27FC236}">
+                <a16:creationId xmlns:a16="http://schemas.microsoft.com/office/drawing/2014/main" id="{69D04AD5-C031-4CDF-90D8-97700E56AFCE}"/>
+              </a:ext>
+            </a:extLst>
+          </p:cNvPr>
+          <p:cNvSpPr/>
+          <p:nvPr/>
+        </p:nvSpPr>
+        <p:spPr>
+          <a:xfrm>
+            <a:off x="3040925" y="79778"/>
+            <a:ext cx="3026005" cy="1439148"/>
+          </a:xfrm>
+          <a:prstGeom prst="wedgeRectCallout">
+            <a:avLst>
+              <a:gd name="adj1" fmla="val 193184"/>
+              <a:gd name="adj2" fmla="val 51364"/>
+            </a:avLst>
+          </a:prstGeom>
+        </p:spPr>
+        <p:style>
+          <a:lnRef idx="2">
+            <a:schemeClr val="dk1"/>
+          </a:lnRef>
+          <a:fillRef idx="1">
+            <a:schemeClr val="lt1"/>
+          </a:fillRef>
+          <a:effectRef idx="0">
+            <a:schemeClr val="dk1"/>
+          </a:effectRef>
+          <a:fontRef idx="minor">
+            <a:schemeClr val="dk1"/>
+          </a:fontRef>
+        </p:style>
+        <p:txBody>
+          <a:bodyPr rtlCol="0" anchor="ctr"/>
+          <a:lstStyle/>
+          <a:p>
+            <a:pPr algn="ctr"/>
+            <a:r>
+              <a:rPr lang="en-US" sz="2800" dirty="0" err="1">
+                <a:solidFill>
+                  <a:schemeClr val="tx1"/>
+                </a:solidFill>
+              </a:rPr>
+              <a:t>Amphi</a:t>
+            </a:r>
+            <a:r>
+              <a:rPr lang="en-US" sz="2800" dirty="0">
+                <a:solidFill>
+                  <a:schemeClr val="tx1"/>
+                </a:solidFill>
+              </a:rPr>
+              <a:t> e.068</a:t>
+            </a:r>
+          </a:p>
+          <a:p>
+            <a:pPr algn="ctr"/>
+            <a:r>
+              <a:rPr lang="en-US" sz="2800" dirty="0"/>
+              <a:t>09h30-12h00</a:t>
+            </a:r>
+          </a:p>
+          <a:p>
+            <a:pPr algn="ctr"/>
+            <a:r>
+              <a:rPr lang="en-US" sz="2800" dirty="0"/>
+              <a:t>13h00-15h30</a:t>
+            </a:r>
+          </a:p>
+        </p:txBody>
+      </p:sp>
+      <p:sp>
+        <p:nvSpPr>
+          <p:cNvPr id="14" name="Bulle narrative : rectangle 13">
+            <a:extLst>
+              <a:ext uri="{FF2B5EF4-FFF2-40B4-BE49-F238E27FC236}">
+                <a16:creationId xmlns:a16="http://schemas.microsoft.com/office/drawing/2014/main" id="{5E7EBB3F-FF19-4006-B978-02A2BF223296}"/>
+              </a:ext>
+            </a:extLst>
+          </p:cNvPr>
+          <p:cNvSpPr/>
+          <p:nvPr/>
+        </p:nvSpPr>
+        <p:spPr>
+          <a:xfrm>
+            <a:off x="2823327" y="5339074"/>
+            <a:ext cx="3026005" cy="1439148"/>
+          </a:xfrm>
+          <a:prstGeom prst="wedgeRectCallout">
+            <a:avLst>
+              <a:gd name="adj1" fmla="val 47701"/>
+              <a:gd name="adj2" fmla="val -84227"/>
+            </a:avLst>
+          </a:prstGeom>
+        </p:spPr>
+        <p:style>
+          <a:lnRef idx="2">
+            <a:schemeClr val="dk1"/>
+          </a:lnRef>
+          <a:fillRef idx="1">
+            <a:schemeClr val="lt1"/>
+          </a:fillRef>
+          <a:effectRef idx="0">
+            <a:schemeClr val="dk1"/>
+          </a:effectRef>
+          <a:fontRef idx="minor">
+            <a:schemeClr val="dk1"/>
+          </a:fontRef>
+        </p:style>
+        <p:txBody>
+          <a:bodyPr rtlCol="0" anchor="ctr"/>
+          <a:lstStyle/>
+          <a:p>
+            <a:pPr algn="ctr"/>
+            <a:r>
+              <a:rPr lang="en-US" sz="2800" dirty="0" err="1">
+                <a:solidFill>
+                  <a:schemeClr val="tx1"/>
+                </a:solidFill>
+              </a:rPr>
+              <a:t>Amphi</a:t>
+            </a:r>
+            <a:r>
+              <a:rPr lang="en-US" sz="2800" dirty="0">
+                <a:solidFill>
+                  <a:schemeClr val="tx1"/>
+                </a:solidFill>
+              </a:rPr>
+              <a:t> e.068</a:t>
+            </a:r>
+          </a:p>
+          <a:p>
+            <a:pPr algn="ctr"/>
+            <a:r>
+              <a:rPr lang="en-US" sz="2800" dirty="0">
+                <a:solidFill>
+                  <a:srgbClr val="FF0000"/>
+                </a:solidFill>
+              </a:rPr>
+              <a:t>09h00</a:t>
+            </a:r>
+            <a:r>
+              <a:rPr lang="en-US" sz="2800" dirty="0"/>
+              <a:t>-12h00</a:t>
+            </a:r>
+          </a:p>
+          <a:p>
+            <a:pPr algn="ctr"/>
+            <a:r>
+              <a:rPr lang="en-US" sz="2800" dirty="0"/>
+              <a:t>13h00-</a:t>
+            </a:r>
+            <a:r>
+              <a:rPr lang="en-US" sz="2800" dirty="0">
+                <a:solidFill>
+                  <a:srgbClr val="FF0000"/>
+                </a:solidFill>
+              </a:rPr>
+              <a:t>15h00</a:t>
+            </a:r>
+          </a:p>
+        </p:txBody>
+      </p:sp>
+      <p:sp>
+        <p:nvSpPr>
+          <p:cNvPr id="15" name="Bulle narrative : rectangle 14">
+            <a:extLst>
+              <a:ext uri="{FF2B5EF4-FFF2-40B4-BE49-F238E27FC236}">
+                <a16:creationId xmlns:a16="http://schemas.microsoft.com/office/drawing/2014/main" id="{F825E06B-50EC-4BA0-97B6-652E911CE93E}"/>
+              </a:ext>
+            </a:extLst>
+          </p:cNvPr>
+          <p:cNvSpPr/>
+          <p:nvPr/>
+        </p:nvSpPr>
+        <p:spPr>
+          <a:xfrm>
+            <a:off x="8327795" y="5339074"/>
+            <a:ext cx="3026005" cy="1439148"/>
+          </a:xfrm>
+          <a:prstGeom prst="wedgeRectCallout">
+            <a:avLst>
+              <a:gd name="adj1" fmla="val -42642"/>
+              <a:gd name="adj2" fmla="val -84227"/>
+            </a:avLst>
+          </a:prstGeom>
+        </p:spPr>
+        <p:style>
+          <a:lnRef idx="2">
+            <a:schemeClr val="dk1"/>
+          </a:lnRef>
+          <a:fillRef idx="1">
+            <a:schemeClr val="lt1"/>
+          </a:fillRef>
+          <a:effectRef idx="0">
+            <a:schemeClr val="dk1"/>
+          </a:effectRef>
+          <a:fontRef idx="minor">
+            <a:schemeClr val="dk1"/>
+          </a:fontRef>
+        </p:style>
+        <p:txBody>
+          <a:bodyPr rtlCol="0" anchor="ctr"/>
+          <a:lstStyle/>
+          <a:p>
+            <a:pPr algn="ctr"/>
+            <a:r>
+              <a:rPr lang="en-US" sz="2800" dirty="0" err="1">
+                <a:solidFill>
+                  <a:srgbClr val="FF0000"/>
+                </a:solidFill>
+              </a:rPr>
+              <a:t>Amphi</a:t>
+            </a:r>
+            <a:r>
+              <a:rPr lang="en-US" sz="2800" dirty="0">
+                <a:solidFill>
+                  <a:srgbClr val="FF0000"/>
+                </a:solidFill>
+              </a:rPr>
+              <a:t> III</a:t>
+            </a:r>
+          </a:p>
+          <a:p>
+            <a:pPr algn="ctr"/>
+            <a:r>
+              <a:rPr lang="en-US" sz="2800" dirty="0">
+                <a:solidFill>
+                  <a:srgbClr val="FF0000"/>
+                </a:solidFill>
+              </a:rPr>
+              <a:t>09h45</a:t>
+            </a:r>
+            <a:r>
+              <a:rPr lang="en-US" sz="2800" dirty="0"/>
+              <a:t>-12h00</a:t>
+            </a:r>
+          </a:p>
+          <a:p>
+            <a:pPr algn="ctr"/>
+            <a:r>
+              <a:rPr lang="en-US" sz="2800" dirty="0"/>
+              <a:t>13h00-</a:t>
+            </a:r>
+            <a:r>
+              <a:rPr lang="en-US" sz="2800" dirty="0">
+                <a:solidFill>
+                  <a:srgbClr val="FF0000"/>
+                </a:solidFill>
+              </a:rPr>
+              <a:t>15h45</a:t>
+            </a:r>
+          </a:p>
+        </p:txBody>
+      </p:sp>
+    </p:spTree>
+    <p:extLst>
+      <p:ext uri="{BB962C8B-B14F-4D97-AF65-F5344CB8AC3E}">
+        <p14:creationId xmlns:p14="http://schemas.microsoft.com/office/powerpoint/2010/main" val="2241520837"/>
+      </p:ext>
+    </p:extLst>
+  </p:cSld>
+  <p:clrMapOvr>
+    <a:masterClrMapping/>
+  </p:clrMapOvr>
+</p:sld>
+</file>
+
+<file path=ppt/slides/slide21.xml><?xml version="1.0" encoding="utf-8"?>
+<p:sld xmlns:a="http://schemas.openxmlformats.org/drawingml/2006/main" xmlns:r="http://schemas.openxmlformats.org/officeDocument/2006/relationships" xmlns:p="http://schemas.openxmlformats.org/presentationml/2006/main">
+  <p:cSld>
+    <p:spTree>
+      <p:nvGrpSpPr>
+        <p:cNvPr id="1" name=""/>
+        <p:cNvGrpSpPr/>
+        <p:nvPr/>
+      </p:nvGrpSpPr>
+      <p:grpSpPr>
+        <a:xfrm>
+          <a:off x="0" y="0"/>
+          <a:ext cx="0" cy="0"/>
+          <a:chOff x="0" y="0"/>
+          <a:chExt cx="0" cy="0"/>
+        </a:xfrm>
+      </p:grpSpPr>
+      <p:sp>
+        <p:nvSpPr>
+          <p:cNvPr id="2" name="Titre 1">
+            <a:extLst>
+              <a:ext uri="{FF2B5EF4-FFF2-40B4-BE49-F238E27FC236}">
+                <a16:creationId xmlns:a16="http://schemas.microsoft.com/office/drawing/2014/main" id="{563510CA-3994-440D-9624-DEF4A6B4D263}"/>
+              </a:ext>
+            </a:extLst>
+          </p:cNvPr>
+          <p:cNvSpPr>
+            <a:spLocks noGrp="1"/>
+          </p:cNvSpPr>
+          <p:nvPr>
+            <p:ph type="title"/>
+          </p:nvPr>
+        </p:nvSpPr>
+        <p:spPr/>
+        <p:txBody>
+          <a:bodyPr>
+            <a:normAutofit/>
+          </a:bodyPr>
+          <a:lstStyle/>
+          <a:p>
+            <a:r>
+              <a:rPr lang="en-US" dirty="0"/>
+              <a:t>(Tentative) Planning</a:t>
+            </a:r>
+          </a:p>
+        </p:txBody>
+      </p:sp>
+      <p:sp>
+        <p:nvSpPr>
+          <p:cNvPr id="3" name="Espace réservé du texte 2">
+            <a:extLst>
+              <a:ext uri="{FF2B5EF4-FFF2-40B4-BE49-F238E27FC236}">
+                <a16:creationId xmlns:a16="http://schemas.microsoft.com/office/drawing/2014/main" id="{CDF58B45-85FA-4108-AA84-5A31C0552D03}"/>
+              </a:ext>
+            </a:extLst>
+          </p:cNvPr>
+          <p:cNvSpPr>
+            <a:spLocks noGrp="1"/>
+          </p:cNvSpPr>
+          <p:nvPr>
+            <p:ph type="body" sz="quarter" idx="10"/>
+          </p:nvPr>
+        </p:nvSpPr>
+        <p:spPr/>
+        <p:txBody>
+          <a:bodyPr/>
+          <a:lstStyle/>
+          <a:p>
+            <a:endParaRPr lang="en-US" dirty="0"/>
+          </a:p>
+        </p:txBody>
+      </p:sp>
+      <p:sp>
+        <p:nvSpPr>
+          <p:cNvPr id="4" name="Rectangle : coins arrondis 3">
+            <a:extLst>
+              <a:ext uri="{FF2B5EF4-FFF2-40B4-BE49-F238E27FC236}">
+                <a16:creationId xmlns:a16="http://schemas.microsoft.com/office/drawing/2014/main" id="{B50E40AE-B061-4015-AD26-DD07FB8047D6}"/>
+              </a:ext>
+            </a:extLst>
+          </p:cNvPr>
+          <p:cNvSpPr/>
+          <p:nvPr/>
+        </p:nvSpPr>
+        <p:spPr>
+          <a:xfrm>
+            <a:off x="630806" y="1423358"/>
+            <a:ext cx="1885360" cy="4458968"/>
+          </a:xfrm>
+          <a:prstGeom prst="roundRect">
+            <a:avLst/>
+          </a:prstGeom>
+          <a:solidFill>
+            <a:schemeClr val="accent6">
+              <a:lumMod val="50000"/>
+            </a:schemeClr>
+          </a:solidFill>
+          <a:ln>
+            <a:solidFill>
+              <a:schemeClr val="accent6">
+                <a:lumMod val="50000"/>
+              </a:schemeClr>
+            </a:solidFill>
+          </a:ln>
+        </p:spPr>
+        <p:style>
+          <a:lnRef idx="2">
+            <a:schemeClr val="accent1">
+              <a:shade val="50000"/>
+            </a:schemeClr>
+          </a:lnRef>
+          <a:fillRef idx="1">
+            <a:schemeClr val="accent1"/>
+          </a:fillRef>
+          <a:effectRef idx="0">
+            <a:schemeClr val="accent1"/>
+          </a:effectRef>
+          <a:fontRef idx="minor">
+            <a:schemeClr val="lt1"/>
+          </a:fontRef>
+        </p:style>
+        <p:txBody>
+          <a:bodyPr rtlCol="0" anchor="ctr"/>
+          <a:lstStyle/>
+          <a:p>
+            <a:pPr algn="ctr"/>
+            <a:r>
+              <a:rPr lang="en-US" b="1" dirty="0"/>
+              <a:t>December 02</a:t>
+            </a:r>
+            <a:br>
+              <a:rPr lang="en-US" dirty="0"/>
+            </a:br>
+            <a:r>
+              <a:rPr lang="en-US" dirty="0"/>
+              <a:t>Introduction,</a:t>
+            </a:r>
+            <a:br>
+              <a:rPr lang="en-US" dirty="0"/>
+            </a:br>
+            <a:r>
+              <a:rPr lang="en-US" dirty="0"/>
+              <a:t>ML summary,</a:t>
+            </a:r>
+            <a:br>
+              <a:rPr lang="en-US" dirty="0"/>
+            </a:br>
+            <a:r>
+              <a:rPr lang="en-US" dirty="0"/>
+              <a:t>Basics of deep neural networks</a:t>
+            </a:r>
+          </a:p>
+        </p:txBody>
+      </p:sp>
+      <p:sp>
+        <p:nvSpPr>
+          <p:cNvPr id="5" name="Rectangle : coins arrondis 4">
+            <a:extLst>
+              <a:ext uri="{FF2B5EF4-FFF2-40B4-BE49-F238E27FC236}">
+                <a16:creationId xmlns:a16="http://schemas.microsoft.com/office/drawing/2014/main" id="{927828C2-D2D1-4745-A760-DE543579A63B}"/>
+              </a:ext>
+            </a:extLst>
+          </p:cNvPr>
+          <p:cNvSpPr/>
+          <p:nvPr/>
+        </p:nvSpPr>
+        <p:spPr>
+          <a:xfrm>
+            <a:off x="2904238" y="1423358"/>
+            <a:ext cx="1885360" cy="4458968"/>
+          </a:xfrm>
+          <a:prstGeom prst="roundRect">
+            <a:avLst/>
+          </a:prstGeom>
+          <a:solidFill>
+            <a:schemeClr val="accent6">
+              <a:lumMod val="75000"/>
+            </a:schemeClr>
+          </a:solidFill>
+          <a:ln>
+            <a:solidFill>
+              <a:schemeClr val="accent6">
+                <a:lumMod val="50000"/>
+              </a:schemeClr>
+            </a:solidFill>
+          </a:ln>
+        </p:spPr>
+        <p:style>
+          <a:lnRef idx="2">
+            <a:schemeClr val="accent1">
+              <a:shade val="50000"/>
+            </a:schemeClr>
+          </a:lnRef>
+          <a:fillRef idx="1">
+            <a:schemeClr val="accent1"/>
+          </a:fillRef>
+          <a:effectRef idx="0">
+            <a:schemeClr val="accent1"/>
+          </a:effectRef>
+          <a:fontRef idx="minor">
+            <a:schemeClr val="lt1"/>
+          </a:fontRef>
+        </p:style>
+        <p:txBody>
+          <a:bodyPr rtlCol="0" anchor="ctr"/>
+          <a:lstStyle/>
+          <a:p>
+            <a:pPr algn="ctr"/>
+            <a:r>
+              <a:rPr lang="en-US" b="1" dirty="0"/>
+              <a:t>December 04</a:t>
+            </a:r>
+            <a:br>
+              <a:rPr lang="en-US" dirty="0"/>
+            </a:br>
+            <a:r>
+              <a:rPr lang="en-US" dirty="0"/>
+              <a:t>Convolutional Neural Networks</a:t>
+            </a:r>
+          </a:p>
+        </p:txBody>
+      </p:sp>
+      <p:sp>
+        <p:nvSpPr>
+          <p:cNvPr id="6" name="Rectangle : coins arrondis 5">
+            <a:extLst>
+              <a:ext uri="{FF2B5EF4-FFF2-40B4-BE49-F238E27FC236}">
+                <a16:creationId xmlns:a16="http://schemas.microsoft.com/office/drawing/2014/main" id="{0EFCF3FA-5F5F-4A88-A1BF-99B1CB79B13D}"/>
+              </a:ext>
+            </a:extLst>
+          </p:cNvPr>
+          <p:cNvSpPr/>
+          <p:nvPr/>
+        </p:nvSpPr>
+        <p:spPr>
+          <a:xfrm>
+            <a:off x="5177670" y="1423358"/>
+            <a:ext cx="1885360" cy="4458968"/>
+          </a:xfrm>
+          <a:prstGeom prst="roundRect">
+            <a:avLst/>
+          </a:prstGeom>
+          <a:solidFill>
+            <a:schemeClr val="accent6">
+              <a:lumMod val="60000"/>
+              <a:lumOff val="40000"/>
+            </a:schemeClr>
+          </a:solidFill>
+          <a:ln>
+            <a:solidFill>
+              <a:schemeClr val="accent6">
+                <a:lumMod val="50000"/>
+              </a:schemeClr>
+            </a:solidFill>
+          </a:ln>
+        </p:spPr>
+        <p:style>
+          <a:lnRef idx="2">
+            <a:schemeClr val="accent1">
+              <a:shade val="50000"/>
+            </a:schemeClr>
+          </a:lnRef>
+          <a:fillRef idx="1">
+            <a:schemeClr val="accent1"/>
+          </a:fillRef>
+          <a:effectRef idx="0">
+            <a:schemeClr val="accent1"/>
+          </a:effectRef>
+          <a:fontRef idx="minor">
+            <a:schemeClr val="lt1"/>
+          </a:fontRef>
+        </p:style>
+        <p:txBody>
+          <a:bodyPr rtlCol="0" anchor="ctr"/>
+          <a:lstStyle/>
+          <a:p>
+            <a:pPr algn="ctr"/>
+            <a:r>
+              <a:rPr lang="en-US" b="1" dirty="0"/>
+              <a:t>December 06</a:t>
+            </a:r>
+            <a:br>
+              <a:rPr lang="en-US" dirty="0"/>
+            </a:br>
+            <a:r>
+              <a:rPr lang="en-US" dirty="0"/>
+              <a:t>Recurrent Neural Networks, Embeddings,</a:t>
+            </a:r>
+          </a:p>
+          <a:p>
+            <a:pPr algn="ctr"/>
+            <a:r>
+              <a:rPr lang="en-US" dirty="0"/>
+              <a:t>Autoencoders</a:t>
+            </a:r>
+          </a:p>
+          <a:p>
+            <a:pPr algn="ctr"/>
+            <a:endParaRPr lang="en-US" dirty="0"/>
+          </a:p>
+        </p:txBody>
+      </p:sp>
+      <p:sp>
+        <p:nvSpPr>
+          <p:cNvPr id="7" name="Rectangle : coins arrondis 6">
+            <a:extLst>
+              <a:ext uri="{FF2B5EF4-FFF2-40B4-BE49-F238E27FC236}">
+                <a16:creationId xmlns:a16="http://schemas.microsoft.com/office/drawing/2014/main" id="{3AD48CF9-87DC-4C66-92EC-8A3B98F62C0B}"/>
+              </a:ext>
+            </a:extLst>
+          </p:cNvPr>
+          <p:cNvSpPr/>
+          <p:nvPr/>
+        </p:nvSpPr>
+        <p:spPr>
+          <a:xfrm>
+            <a:off x="7451102" y="1423358"/>
+            <a:ext cx="1885360" cy="4458968"/>
+          </a:xfrm>
+          <a:prstGeom prst="roundRect">
+            <a:avLst/>
+          </a:prstGeom>
+          <a:solidFill>
+            <a:schemeClr val="accent6">
+              <a:lumMod val="40000"/>
+              <a:lumOff val="60000"/>
+            </a:schemeClr>
+          </a:solidFill>
+          <a:ln>
+            <a:solidFill>
+              <a:schemeClr val="accent6">
+                <a:lumMod val="50000"/>
+              </a:schemeClr>
+            </a:solidFill>
+          </a:ln>
+        </p:spPr>
+        <p:style>
+          <a:lnRef idx="2">
+            <a:schemeClr val="accent1">
+              <a:shade val="50000"/>
+            </a:schemeClr>
+          </a:lnRef>
+          <a:fillRef idx="1">
+            <a:schemeClr val="accent1"/>
+          </a:fillRef>
+          <a:effectRef idx="0">
+            <a:schemeClr val="accent1"/>
+          </a:effectRef>
+          <a:fontRef idx="minor">
+            <a:schemeClr val="lt1"/>
+          </a:fontRef>
+        </p:style>
+        <p:txBody>
+          <a:bodyPr rtlCol="0" anchor="ctr"/>
+          <a:lstStyle/>
+          <a:p>
+            <a:pPr algn="ctr"/>
+            <a:r>
+              <a:rPr lang="en-US" b="1" dirty="0">
+                <a:solidFill>
+                  <a:schemeClr val="tx1"/>
+                </a:solidFill>
+              </a:rPr>
+              <a:t>December 09</a:t>
+            </a:r>
+          </a:p>
+          <a:p>
+            <a:pPr algn="ctr"/>
+            <a:r>
+              <a:rPr lang="en-US" dirty="0">
+                <a:solidFill>
+                  <a:schemeClr val="tx1"/>
+                </a:solidFill>
+              </a:rPr>
+              <a:t>Generative models, Deep reinforcement learning, Concept bottlenecks</a:t>
+            </a:r>
+          </a:p>
+          <a:p>
+            <a:pPr algn="ctr"/>
+            <a:endParaRPr lang="en-US" dirty="0"/>
+          </a:p>
+        </p:txBody>
+      </p:sp>
+      <p:sp>
+        <p:nvSpPr>
+          <p:cNvPr id="8" name="Rectangle : coins arrondis 7">
+            <a:extLst>
+              <a:ext uri="{FF2B5EF4-FFF2-40B4-BE49-F238E27FC236}">
+                <a16:creationId xmlns:a16="http://schemas.microsoft.com/office/drawing/2014/main" id="{42DB3220-30E7-4BB7-9332-1FB053E084B2}"/>
+              </a:ext>
+            </a:extLst>
+          </p:cNvPr>
+          <p:cNvSpPr/>
+          <p:nvPr/>
+        </p:nvSpPr>
+        <p:spPr>
+          <a:xfrm>
+            <a:off x="9724534" y="1423358"/>
+            <a:ext cx="1885360" cy="4458968"/>
+          </a:xfrm>
+          <a:prstGeom prst="roundRect">
+            <a:avLst/>
+          </a:prstGeom>
+          <a:solidFill>
+            <a:schemeClr val="accent6">
+              <a:lumMod val="20000"/>
+              <a:lumOff val="80000"/>
+            </a:schemeClr>
+          </a:solidFill>
+          <a:ln>
+            <a:solidFill>
+              <a:schemeClr val="accent6">
+                <a:lumMod val="50000"/>
+              </a:schemeClr>
+            </a:solidFill>
+          </a:ln>
+        </p:spPr>
+        <p:style>
+          <a:lnRef idx="2">
+            <a:schemeClr val="accent1">
+              <a:shade val="50000"/>
+            </a:schemeClr>
+          </a:lnRef>
+          <a:fillRef idx="1">
+            <a:schemeClr val="accent1"/>
+          </a:fillRef>
+          <a:effectRef idx="0">
+            <a:schemeClr val="accent1"/>
+          </a:effectRef>
+          <a:fontRef idx="minor">
+            <a:schemeClr val="lt1"/>
+          </a:fontRef>
+        </p:style>
+        <p:txBody>
+          <a:bodyPr rtlCol="0" anchor="ctr"/>
+          <a:lstStyle/>
+          <a:p>
+            <a:pPr algn="ctr"/>
+            <a:r>
+              <a:rPr lang="en-US" b="1" dirty="0">
+                <a:solidFill>
+                  <a:schemeClr val="tx1"/>
+                </a:solidFill>
+              </a:rPr>
+              <a:t>December 11</a:t>
+            </a:r>
+          </a:p>
+          <a:p>
+            <a:pPr algn="ctr"/>
+            <a:r>
+              <a:rPr lang="en-US" dirty="0">
+                <a:solidFill>
+                  <a:schemeClr val="tx1"/>
+                </a:solidFill>
+              </a:rPr>
+              <a:t>Project and/or advanced topics (Physics-informed Neural Networks, Hybrid models, Neural-symbolic AI, Causality)</a:t>
+            </a:r>
+          </a:p>
+        </p:txBody>
+      </p:sp>
+      <p:sp>
+        <p:nvSpPr>
+          <p:cNvPr id="9" name="Bulle narrative : rectangle 8">
+            <a:extLst>
+              <a:ext uri="{FF2B5EF4-FFF2-40B4-BE49-F238E27FC236}">
+                <a16:creationId xmlns:a16="http://schemas.microsoft.com/office/drawing/2014/main" id="{F78501C1-06D2-4430-8B71-6C00C2AD2CB0}"/>
+              </a:ext>
+            </a:extLst>
+          </p:cNvPr>
+          <p:cNvSpPr/>
+          <p:nvPr/>
+        </p:nvSpPr>
+        <p:spPr>
+          <a:xfrm>
             <a:off x="3149337" y="1112362"/>
             <a:ext cx="5665510" cy="1885361"/>
           </a:xfrm>
           <a:prstGeom prst="wedgeRectCallout">
             <a:avLst>
-              <a:gd name="adj1" fmla="val 83451"/>
+              <a:gd name="adj1" fmla="val 55464"/>
               <a:gd name="adj2" fmla="val -9666"/>
             </a:avLst>
           </a:prstGeom>
@@ -5994,7 +7587,7 @@
             <a:pPr algn="ctr"/>
             <a:r>
               <a:rPr lang="en-US" sz="2400" dirty="0"/>
-              <a:t>April 12, 10:00-12:00</a:t>
+              <a:t>???</a:t>
             </a:r>
           </a:p>
           <a:p>
@@ -6047,10 +7640,10 @@
       </p:sp>
       <p:sp>
         <p:nvSpPr>
-          <p:cNvPr id="19" name="Bulle narrative : rectangle 18">
-            <a:extLst>
-              <a:ext uri="{FF2B5EF4-FFF2-40B4-BE49-F238E27FC236}">
-                <a16:creationId xmlns:a16="http://schemas.microsoft.com/office/drawing/2014/main" id="{270A8EC9-15BE-49F9-B3C7-847241402EEF}"/>
+          <p:cNvPr id="11" name="Bulle narrative : rectangle 10">
+            <a:extLst>
+              <a:ext uri="{FF2B5EF4-FFF2-40B4-BE49-F238E27FC236}">
+                <a16:creationId xmlns:a16="http://schemas.microsoft.com/office/drawing/2014/main" id="{4E3B5CDD-B261-4FC8-A684-5FF98F8B4A01}"/>
               </a:ext>
             </a:extLst>
           </p:cNvPr>
@@ -6059,13 +7652,13 @@
         </p:nvSpPr>
         <p:spPr>
           <a:xfrm>
-            <a:off x="5367777" y="4707161"/>
-            <a:ext cx="3026005" cy="930068"/>
+            <a:off x="3149337" y="1112362"/>
+            <a:ext cx="5665510" cy="1885361"/>
           </a:xfrm>
           <a:prstGeom prst="wedgeRectCallout">
             <a:avLst>
-              <a:gd name="adj1" fmla="val -90615"/>
-              <a:gd name="adj2" fmla="val -67851"/>
+              <a:gd name="adj1" fmla="val 75210"/>
+              <a:gd name="adj2" fmla="val 3749"/>
             </a:avLst>
           </a:prstGeom>
         </p:spPr>
@@ -6089,8 +7682,54 @@
           <a:p>
             <a:pPr algn="ctr"/>
             <a:r>
-              <a:rPr lang="en-US" sz="2800" dirty="0"/>
-              <a:t>“Buffer” day</a:t>
+              <a:rPr lang="en-US" sz="2400" dirty="0"/>
+              <a:t>???</a:t>
+            </a:r>
+          </a:p>
+          <a:p>
+            <a:pPr algn="ctr"/>
+            <a:r>
+              <a:rPr lang="en-US" sz="2400" i="1" dirty="0"/>
+              <a:t>Relational Concept Bottleneck Models</a:t>
+            </a:r>
+          </a:p>
+          <a:p>
+            <a:pPr algn="ctr"/>
+            <a:r>
+              <a:rPr lang="en-US" sz="2400" b="1" dirty="0"/>
+              <a:t>Pietro </a:t>
+            </a:r>
+            <a:r>
+              <a:rPr lang="en-US" sz="2400" b="1" dirty="0" err="1"/>
+              <a:t>Barbiero</a:t>
+            </a:r>
+            <a:r>
+              <a:rPr lang="en-US" sz="2400" dirty="0"/>
+              <a:t> (Cambridge, UK and Univ. </a:t>
+            </a:r>
+            <a:r>
+              <a:rPr lang="en-US" sz="2400" dirty="0" err="1"/>
+              <a:t>della</a:t>
+            </a:r>
+            <a:r>
+              <a:rPr lang="en-US" sz="2400" dirty="0"/>
+              <a:t> </a:t>
+            </a:r>
+            <a:r>
+              <a:rPr lang="en-US" sz="2400" dirty="0" err="1"/>
+              <a:t>Svizzera</a:t>
+            </a:r>
+            <a:r>
+              <a:rPr lang="en-US" sz="2400" dirty="0"/>
+              <a:t> </a:t>
+            </a:r>
+            <a:r>
+              <a:rPr lang="en-US" sz="2400" dirty="0" err="1"/>
+              <a:t>Italiana</a:t>
+            </a:r>
+            <a:r>
+              <a:rPr lang="en-US" sz="2400" dirty="0"/>
+              <a:t>, Switzerland)</a:t>
             </a:r>
           </a:p>
         </p:txBody>
@@ -6098,7 +7737,7 @@
     </p:spTree>
     <p:extLst>
       <p:ext uri="{BB962C8B-B14F-4D97-AF65-F5344CB8AC3E}">
-        <p14:creationId xmlns:p14="http://schemas.microsoft.com/office/powerpoint/2010/main" val="2254307127"/>
+        <p14:creationId xmlns:p14="http://schemas.microsoft.com/office/powerpoint/2010/main" val="2219504630"/>
       </p:ext>
     </p:extLst>
   </p:cSld>
@@ -6108,7 +7747,7 @@
 </p:sld>
 </file>
 
-<file path=ppt/slides/slide19.xml><?xml version="1.0" encoding="utf-8"?>
+<file path=ppt/slides/slide22.xml><?xml version="1.0" encoding="utf-8"?>
 <p:sld xmlns:a="http://schemas.openxmlformats.org/drawingml/2006/main" xmlns:r="http://schemas.openxmlformats.org/officeDocument/2006/relationships" xmlns:p="http://schemas.openxmlformats.org/presentationml/2006/main">
   <p:cSld>
     <p:spTree>
@@ -6591,93 +8230,6 @@
 </p:sld>
 </file>
 
-<file path=ppt/slides/slide2.xml><?xml version="1.0" encoding="utf-8"?>
-<p:sld xmlns:a="http://schemas.openxmlformats.org/drawingml/2006/main" xmlns:r="http://schemas.openxmlformats.org/officeDocument/2006/relationships" xmlns:p="http://schemas.openxmlformats.org/presentationml/2006/main">
-  <p:cSld>
-    <p:spTree>
-      <p:nvGrpSpPr>
-        <p:cNvPr id="1" name=""/>
-        <p:cNvGrpSpPr/>
-        <p:nvPr/>
-      </p:nvGrpSpPr>
-      <p:grpSpPr>
-        <a:xfrm>
-          <a:off x="0" y="0"/>
-          <a:ext cx="0" cy="0"/>
-          <a:chOff x="0" y="0"/>
-          <a:chExt cx="0" cy="0"/>
-        </a:xfrm>
-      </p:grpSpPr>
-      <p:sp>
-        <p:nvSpPr>
-          <p:cNvPr id="2" name="Titre 1"/>
-          <p:cNvSpPr>
-            <a:spLocks noGrp="1"/>
-          </p:cNvSpPr>
-          <p:nvPr>
-            <p:ph type="title"/>
-          </p:nvPr>
-        </p:nvSpPr>
-        <p:spPr/>
-        <p:txBody>
-          <a:bodyPr/>
-          <a:lstStyle/>
-          <a:p>
-            <a:r>
-              <a:rPr lang="en-US" dirty="0"/>
-              <a:t>Objective of this class</a:t>
-            </a:r>
-          </a:p>
-        </p:txBody>
-      </p:sp>
-      <p:sp>
-        <p:nvSpPr>
-          <p:cNvPr id="3" name="Espace réservé du texte 2"/>
-          <p:cNvSpPr>
-            <a:spLocks noGrp="1"/>
-          </p:cNvSpPr>
-          <p:nvPr>
-            <p:ph type="body" sz="quarter" idx="10"/>
-          </p:nvPr>
-        </p:nvSpPr>
-        <p:spPr/>
-        <p:txBody>
-          <a:bodyPr>
-            <a:normAutofit/>
-          </a:bodyPr>
-          <a:lstStyle/>
-          <a:p>
-            <a:pPr marL="0" indent="0" algn="ctr">
-              <a:buNone/>
-            </a:pPr>
-            <a:r>
-              <a:rPr lang="en-US" sz="4800" dirty="0"/>
-              <a:t>Overview of deep learning architectures and applications, using </a:t>
-            </a:r>
-            <a:r>
-              <a:rPr lang="en-US" sz="4800" b="1" dirty="0" err="1"/>
-              <a:t>pytorch</a:t>
-            </a:r>
-            <a:r>
-              <a:rPr lang="en-US" sz="4800" dirty="0"/>
-              <a:t> as the support library</a:t>
-            </a:r>
-          </a:p>
-        </p:txBody>
-      </p:sp>
-    </p:spTree>
-    <p:extLst>
-      <p:ext uri="{BB962C8B-B14F-4D97-AF65-F5344CB8AC3E}">
-        <p14:creationId xmlns:p14="http://schemas.microsoft.com/office/powerpoint/2010/main" val="750272096"/>
-      </p:ext>
-    </p:extLst>
-  </p:cSld>
-  <p:clrMapOvr>
-    <a:masterClrMapping/>
-  </p:clrMapOvr>
-</p:sld>
-</file>
-
 <file path=ppt/slides/slide3.xml><?xml version="1.0" encoding="utf-8"?>
 <p:sld xmlns:a="http://schemas.openxmlformats.org/drawingml/2006/main" xmlns:r="http://schemas.openxmlformats.org/officeDocument/2006/relationships" xmlns:p="http://schemas.openxmlformats.org/presentationml/2006/main">
   <p:cSld>
@@ -6718,7 +8270,7 @@
           <a:p>
             <a:r>
               <a:rPr lang="en-US" dirty="0"/>
-              <a:t>Objective of the class</a:t>
+              <a:t>Objective of this class</a:t>
             </a:r>
           </a:p>
         </p:txBody>
@@ -7521,7 +9073,9 @@
         </p:nvSpPr>
         <p:spPr/>
         <p:txBody>
-          <a:bodyPr/>
+          <a:bodyPr>
+            <a:noAutofit/>
+          </a:bodyPr>
           <a:lstStyle/>
           <a:p>
             <a:r>
@@ -7574,6 +9128,13 @@
             <a:r>
               <a:rPr lang="en-US" dirty="0"/>
               <a:t>Assistants for text and code generation</a:t>
+            </a:r>
+          </a:p>
+          <a:p>
+            <a:pPr lvl="1"/>
+            <a:r>
+              <a:rPr lang="en-US" dirty="0"/>
+              <a:t>Prediction of protein structures</a:t>
             </a:r>
           </a:p>
           <a:p>
@@ -7640,6 +9201,170 @@
 </file>
 
 <file path=ppt/slides/slide8.xml><?xml version="1.0" encoding="utf-8"?>
+<p:sld xmlns:a="http://schemas.openxmlformats.org/drawingml/2006/main" xmlns:r="http://schemas.openxmlformats.org/officeDocument/2006/relationships" xmlns:p="http://schemas.openxmlformats.org/presentationml/2006/main">
+  <p:cSld>
+    <p:spTree>
+      <p:nvGrpSpPr>
+        <p:cNvPr id="1" name=""/>
+        <p:cNvGrpSpPr/>
+        <p:nvPr/>
+      </p:nvGrpSpPr>
+      <p:grpSpPr>
+        <a:xfrm>
+          <a:off x="0" y="0"/>
+          <a:ext cx="0" cy="0"/>
+          <a:chOff x="0" y="0"/>
+          <a:chExt cx="0" cy="0"/>
+        </a:xfrm>
+      </p:grpSpPr>
+      <p:sp>
+        <p:nvSpPr>
+          <p:cNvPr id="2" name="Titre 1">
+            <a:extLst>
+              <a:ext uri="{FF2B5EF4-FFF2-40B4-BE49-F238E27FC236}">
+                <a16:creationId xmlns:a16="http://schemas.microsoft.com/office/drawing/2014/main" id="{C391D3D0-AF2E-4110-A559-3796B17CDD49}"/>
+              </a:ext>
+            </a:extLst>
+          </p:cNvPr>
+          <p:cNvSpPr>
+            <a:spLocks noGrp="1"/>
+          </p:cNvSpPr>
+          <p:nvPr>
+            <p:ph type="title"/>
+          </p:nvPr>
+        </p:nvSpPr>
+        <p:spPr/>
+        <p:txBody>
+          <a:bodyPr/>
+          <a:lstStyle/>
+          <a:p>
+            <a:r>
+              <a:rPr lang="en-US" dirty="0"/>
+              <a:t>Why is this subject relevant now?</a:t>
+            </a:r>
+          </a:p>
+        </p:txBody>
+      </p:sp>
+      <p:sp>
+        <p:nvSpPr>
+          <p:cNvPr id="3" name="Espace réservé du texte 2">
+            <a:extLst>
+              <a:ext uri="{FF2B5EF4-FFF2-40B4-BE49-F238E27FC236}">
+                <a16:creationId xmlns:a16="http://schemas.microsoft.com/office/drawing/2014/main" id="{06C87C2C-71C0-41F4-A550-5D612F0E620E}"/>
+              </a:ext>
+            </a:extLst>
+          </p:cNvPr>
+          <p:cNvSpPr>
+            <a:spLocks noGrp="1"/>
+          </p:cNvSpPr>
+          <p:nvPr>
+            <p:ph type="body" sz="quarter" idx="10"/>
+          </p:nvPr>
+        </p:nvSpPr>
+        <p:spPr/>
+        <p:txBody>
+          <a:bodyPr/>
+          <a:lstStyle/>
+          <a:p>
+            <a:endParaRPr lang="en-US"/>
+          </a:p>
+        </p:txBody>
+      </p:sp>
+      <p:grpSp>
+        <p:nvGrpSpPr>
+          <p:cNvPr id="4" name="Groupe 3">
+            <a:extLst>
+              <a:ext uri="{FF2B5EF4-FFF2-40B4-BE49-F238E27FC236}">
+                <a16:creationId xmlns:a16="http://schemas.microsoft.com/office/drawing/2014/main" id="{DDC12DFF-E153-4FB9-9F6E-885CAF250648}"/>
+              </a:ext>
+            </a:extLst>
+          </p:cNvPr>
+          <p:cNvGrpSpPr/>
+          <p:nvPr/>
+        </p:nvGrpSpPr>
+        <p:grpSpPr>
+          <a:xfrm>
+            <a:off x="1608449" y="1168389"/>
+            <a:ext cx="8975103" cy="4966288"/>
+            <a:chOff x="2394408" y="1224951"/>
+            <a:chExt cx="8975103" cy="4966288"/>
+          </a:xfrm>
+        </p:grpSpPr>
+        <p:pic>
+          <p:nvPicPr>
+            <p:cNvPr id="5" name="Image 4">
+              <a:extLst>
+                <a:ext uri="{FF2B5EF4-FFF2-40B4-BE49-F238E27FC236}">
+                  <a16:creationId xmlns:a16="http://schemas.microsoft.com/office/drawing/2014/main" id="{F7C7107E-B02E-4C88-90D3-4BBD45394BC2}"/>
+                </a:ext>
+              </a:extLst>
+            </p:cNvPr>
+            <p:cNvPicPr>
+              <a:picLocks noChangeAspect="1"/>
+            </p:cNvPicPr>
+            <p:nvPr/>
+          </p:nvPicPr>
+          <p:blipFill>
+            <a:blip r:embed="rId2"/>
+            <a:stretch>
+              <a:fillRect/>
+            </a:stretch>
+          </p:blipFill>
+          <p:spPr>
+            <a:xfrm>
+              <a:off x="6888332" y="1224951"/>
+              <a:ext cx="4481179" cy="4966288"/>
+            </a:xfrm>
+            <a:prstGeom prst="rect">
+              <a:avLst/>
+            </a:prstGeom>
+          </p:spPr>
+        </p:pic>
+        <p:pic>
+          <p:nvPicPr>
+            <p:cNvPr id="6" name="Image 5">
+              <a:extLst>
+                <a:ext uri="{FF2B5EF4-FFF2-40B4-BE49-F238E27FC236}">
+                  <a16:creationId xmlns:a16="http://schemas.microsoft.com/office/drawing/2014/main" id="{C5ECE2E2-DEDB-4040-80F6-477D9D8B3A5B}"/>
+                </a:ext>
+              </a:extLst>
+            </p:cNvPr>
+            <p:cNvPicPr>
+              <a:picLocks noChangeAspect="1"/>
+            </p:cNvPicPr>
+            <p:nvPr/>
+          </p:nvPicPr>
+          <p:blipFill>
+            <a:blip r:embed="rId3"/>
+            <a:stretch>
+              <a:fillRect/>
+            </a:stretch>
+          </p:blipFill>
+          <p:spPr>
+            <a:xfrm>
+              <a:off x="2394408" y="1224951"/>
+              <a:ext cx="4528622" cy="4966288"/>
+            </a:xfrm>
+            <a:prstGeom prst="rect">
+              <a:avLst/>
+            </a:prstGeom>
+          </p:spPr>
+        </p:pic>
+      </p:grpSp>
+    </p:spTree>
+    <p:extLst>
+      <p:ext uri="{BB962C8B-B14F-4D97-AF65-F5344CB8AC3E}">
+        <p14:creationId xmlns:p14="http://schemas.microsoft.com/office/powerpoint/2010/main" val="2490659959"/>
+      </p:ext>
+    </p:extLst>
+  </p:cSld>
+  <p:clrMapOvr>
+    <a:masterClrMapping/>
+  </p:clrMapOvr>
+</p:sld>
+</file>
+
+<file path=ppt/slides/slide9.xml><?xml version="1.0" encoding="utf-8"?>
 <p:sld xmlns:a="http://schemas.openxmlformats.org/drawingml/2006/main" xmlns:r="http://schemas.openxmlformats.org/officeDocument/2006/relationships" xmlns:p="http://schemas.openxmlformats.org/presentationml/2006/main">
   <p:cSld>
     <p:spTree>
@@ -8430,152 +10155,6 @@
       <p:bldP spid="9" grpId="0" animBg="1"/>
     </p:bldLst>
   </p:timing>
-</p:sld>
-</file>
-
-<file path=ppt/slides/slide9.xml><?xml version="1.0" encoding="utf-8"?>
-<p:sld xmlns:a="http://schemas.openxmlformats.org/drawingml/2006/main" xmlns:r="http://schemas.openxmlformats.org/officeDocument/2006/relationships" xmlns:p="http://schemas.openxmlformats.org/presentationml/2006/main">
-  <p:cSld>
-    <p:spTree>
-      <p:nvGrpSpPr>
-        <p:cNvPr id="1" name=""/>
-        <p:cNvGrpSpPr/>
-        <p:nvPr/>
-      </p:nvGrpSpPr>
-      <p:grpSpPr>
-        <a:xfrm>
-          <a:off x="0" y="0"/>
-          <a:ext cx="0" cy="0"/>
-          <a:chOff x="0" y="0"/>
-          <a:chExt cx="0" cy="0"/>
-        </a:xfrm>
-      </p:grpSpPr>
-      <p:sp>
-        <p:nvSpPr>
-          <p:cNvPr id="2" name="Titre 1"/>
-          <p:cNvSpPr>
-            <a:spLocks noGrp="1"/>
-          </p:cNvSpPr>
-          <p:nvPr>
-            <p:ph type="title"/>
-          </p:nvPr>
-        </p:nvSpPr>
-        <p:spPr/>
-        <p:txBody>
-          <a:bodyPr/>
-          <a:lstStyle/>
-          <a:p>
-            <a:r>
-              <a:rPr lang="en-US" dirty="0"/>
-              <a:t>Current state of the field</a:t>
-            </a:r>
-          </a:p>
-        </p:txBody>
-      </p:sp>
-      <p:sp>
-        <p:nvSpPr>
-          <p:cNvPr id="3" name="Espace réservé du texte 2"/>
-          <p:cNvSpPr>
-            <a:spLocks noGrp="1"/>
-          </p:cNvSpPr>
-          <p:nvPr>
-            <p:ph type="body" sz="quarter" idx="10"/>
-          </p:nvPr>
-        </p:nvSpPr>
-        <p:spPr/>
-        <p:txBody>
-          <a:bodyPr/>
-          <a:lstStyle/>
-          <a:p>
-            <a:r>
-              <a:rPr lang="en-US" dirty="0"/>
-              <a:t>Large availability of open</a:t>
-            </a:r>
-            <a:r>
-              <a:rPr lang="en-US" i="1" dirty="0"/>
-              <a:t>-</a:t>
-            </a:r>
-            <a:r>
-              <a:rPr lang="en-US" i="1" dirty="0" err="1"/>
-              <a:t>ish</a:t>
-            </a:r>
-            <a:r>
-              <a:rPr lang="en-US" dirty="0"/>
-              <a:t> source tools</a:t>
-            </a:r>
-          </a:p>
-          <a:p>
-            <a:pPr lvl="1"/>
-            <a:r>
-              <a:rPr lang="en-US" dirty="0"/>
-              <a:t>The open source movement in computer science is strong</a:t>
-            </a:r>
-          </a:p>
-          <a:p>
-            <a:pPr lvl="1"/>
-            <a:r>
-              <a:rPr lang="en-US" dirty="0"/>
-              <a:t>It’s useful for companies to have other people use their code</a:t>
-            </a:r>
-          </a:p>
-          <a:p>
-            <a:pPr lvl="1"/>
-            <a:r>
-              <a:rPr lang="en-US" dirty="0"/>
-              <a:t>For deep learning, it started with </a:t>
-            </a:r>
-            <a:r>
-              <a:rPr lang="en-US" dirty="0" err="1"/>
-              <a:t>Tensorflow</a:t>
-            </a:r>
-            <a:r>
-              <a:rPr lang="en-US" dirty="0"/>
-              <a:t>, 2017 (Google)</a:t>
-            </a:r>
-          </a:p>
-          <a:p>
-            <a:endParaRPr lang="en-US" dirty="0"/>
-          </a:p>
-          <a:p>
-            <a:r>
-              <a:rPr lang="en-US" dirty="0"/>
-              <a:t>General Purpose Graphic Processing Units (GPGPUs)</a:t>
-            </a:r>
-          </a:p>
-          <a:p>
-            <a:pPr lvl="1"/>
-            <a:r>
-              <a:rPr lang="en-US" dirty="0"/>
-              <a:t>GPUs originally created for gaming, lots of processors (low-spec)</a:t>
-            </a:r>
-          </a:p>
-          <a:p>
-            <a:pPr lvl="1"/>
-            <a:r>
-              <a:rPr lang="en-US" dirty="0"/>
-              <a:t>Great for </a:t>
-            </a:r>
-            <a:r>
-              <a:rPr lang="en-US" i="1" dirty="0"/>
-              <a:t>massive parallelization</a:t>
-            </a:r>
-            <a:r>
-              <a:rPr lang="en-US" dirty="0"/>
-              <a:t> of simple computations</a:t>
-            </a:r>
-          </a:p>
-        </p:txBody>
-      </p:sp>
-    </p:spTree>
-    <p:extLst>
-      <p:ext uri="{BB962C8B-B14F-4D97-AF65-F5344CB8AC3E}">
-        <p14:creationId xmlns:p14="http://schemas.microsoft.com/office/powerpoint/2010/main" val="3344303874"/>
-      </p:ext>
-    </p:extLst>
-  </p:cSld>
-  <p:clrMapOvr>
-    <a:masterClrMapping/>
-  </p:clrMapOvr>
 </p:sld>
 </file>
 

</xml_diff>